<commit_message>
slides-118-BRSKI-AE.pptx: updates by Steffen and David
</commit_message>
<xml_diff>
--- a/presentations/slides-118-BRSKI-AE.pptx
+++ b/presentations/slides-118-BRSKI-AE.pptx
@@ -124,210 +124,6 @@
   <p188:author id="{59D703B0-5D0C-3187-E192-3DE34F2DA597}" name="Brockhaus, Hendrik (T CST SEA-DE)" initials="BH(CSD" userId="S::hendrik.brockhaus@siemens.com::f1e0bebd-314c-47da-b99d-4360ed40ca6f" providerId="AD"/>
   <p188:author id="{8CB336E4-632D-154C-3503-C747A346FBFA}" name="von Oheimb, David (T CST SEA-DE)" initials="vS" userId="S::david.von.oheimb@siemens.com::b10a0893-f9d8-434b-a5e8-6ee626ba9448" providerId="AD"/>
 </p188:authorLst>
-</file>
-
-<file path=ppt/revisionInfo.xml><?xml version="1.0" encoding="utf-8"?>
-<p1510:revInfo xmlns:a="http://schemas.openxmlformats.org/drawingml/2006/main" xmlns:r="http://schemas.openxmlformats.org/officeDocument/2006/relationships" xmlns:p1510="http://schemas.microsoft.com/office/powerpoint/2015/10/main">
-  <p1510:revLst>
-    <p1510:client id="{7162B8FA-8257-B959-3E58-6F1DA1A88B4B}" v="11" dt="2023-03-27T10:05:12.497"/>
-    <p1510:client id="{B16304BF-C6CE-449C-ADFC-69A02EE2B986}" v="35" vWet="49" dt="2023-03-27T09:33:52.074"/>
-    <p1510:client id="{C314CD81-1E67-E862-2E0D-EA4C8E62FDD2}" v="6" dt="2023-03-27T12:55:33.670"/>
-  </p1510:revLst>
-</p1510:revInfo>
-</file>
-
-<file path=ppt/changesInfos/changesInfo1.xml><?xml version="1.0" encoding="utf-8"?>
-<pc:chgInfo xmlns:a="http://schemas.openxmlformats.org/drawingml/2006/main" xmlns:r="http://schemas.openxmlformats.org/officeDocument/2006/relationships" xmlns:ac="http://schemas.microsoft.com/office/drawing/2013/main/command" xmlns:pc="http://schemas.microsoft.com/office/powerpoint/2013/main/command">
-  <pc:docChgLst>
-    <pc:chgData name="Brockhaus, Hendrik (T CST SEA-DE)" userId="f1e0bebd-314c-47da-b99d-4360ed40ca6f" providerId="ADAL" clId="{B16304BF-C6CE-449C-ADFC-69A02EE2B986}"/>
-    <pc:docChg chg="undo custSel modSld">
-      <pc:chgData name="Brockhaus, Hendrik (T CST SEA-DE)" userId="f1e0bebd-314c-47da-b99d-4360ed40ca6f" providerId="ADAL" clId="{B16304BF-C6CE-449C-ADFC-69A02EE2B986}" dt="2023-03-27T09:31:35.191" v="36"/>
-      <pc:docMkLst>
-        <pc:docMk/>
-      </pc:docMkLst>
-      <pc:sldChg chg="modSp mod addCm">
-        <pc:chgData name="Brockhaus, Hendrik (T CST SEA-DE)" userId="f1e0bebd-314c-47da-b99d-4360ed40ca6f" providerId="ADAL" clId="{B16304BF-C6CE-449C-ADFC-69A02EE2B986}" dt="2023-03-27T09:27:47.346" v="4"/>
-        <pc:sldMkLst>
-          <pc:docMk/>
-          <pc:sldMk cId="0" sldId="256"/>
-        </pc:sldMkLst>
-        <pc:spChg chg="mod">
-          <ac:chgData name="Brockhaus, Hendrik (T CST SEA-DE)" userId="f1e0bebd-314c-47da-b99d-4360ed40ca6f" providerId="ADAL" clId="{B16304BF-C6CE-449C-ADFC-69A02EE2B986}" dt="2023-03-27T09:22:39.915" v="1" actId="108"/>
-          <ac:spMkLst>
-            <pc:docMk/>
-            <pc:sldMk cId="0" sldId="256"/>
-            <ac:spMk id="87" creationId="{00000000-0000-0000-0000-000000000000}"/>
-          </ac:spMkLst>
-        </pc:spChg>
-      </pc:sldChg>
-      <pc:sldChg chg="modSp mod addCm modCm">
-        <pc:chgData name="Brockhaus, Hendrik (T CST SEA-DE)" userId="f1e0bebd-314c-47da-b99d-4360ed40ca6f" providerId="ADAL" clId="{B16304BF-C6CE-449C-ADFC-69A02EE2B986}" dt="2023-03-27T09:31:35.191" v="36"/>
-        <pc:sldMkLst>
-          <pc:docMk/>
-          <pc:sldMk cId="0" sldId="258"/>
-        </pc:sldMkLst>
-        <pc:spChg chg="mod">
-          <ac:chgData name="Brockhaus, Hendrik (T CST SEA-DE)" userId="f1e0bebd-314c-47da-b99d-4360ed40ca6f" providerId="ADAL" clId="{B16304BF-C6CE-449C-ADFC-69A02EE2B986}" dt="2023-03-27T09:31:25.754" v="35" actId="20577"/>
-          <ac:spMkLst>
-            <pc:docMk/>
-            <pc:sldMk cId="0" sldId="258"/>
-            <ac:spMk id="170" creationId="{00000000-0000-0000-0000-000000000000}"/>
-          </ac:spMkLst>
-        </pc:spChg>
-      </pc:sldChg>
-    </pc:docChg>
-  </pc:docChgLst>
-  <pc:docChgLst>
-    <pc:chgData name="von Oheimb, David (T CST SEA-DE)" userId="S::david.von.oheimb@siemens.com::b10a0893-f9d8-434b-a5e8-6ee626ba9448" providerId="AD" clId="Web-{C314CD81-1E67-E862-2E0D-EA4C8E62FDD2}"/>
-    <pc:docChg chg="mod modSld">
-      <pc:chgData name="von Oheimb, David (T CST SEA-DE)" userId="S::david.von.oheimb@siemens.com::b10a0893-f9d8-434b-a5e8-6ee626ba9448" providerId="AD" clId="Web-{C314CD81-1E67-E862-2E0D-EA4C8E62FDD2}" dt="2023-03-27T12:55:33.670" v="21" actId="20577"/>
-      <pc:docMkLst>
-        <pc:docMk/>
-      </pc:docMkLst>
-      <pc:sldChg chg="modSp addCm modCm">
-        <pc:chgData name="von Oheimb, David (T CST SEA-DE)" userId="S::david.von.oheimb@siemens.com::b10a0893-f9d8-434b-a5e8-6ee626ba9448" providerId="AD" clId="Web-{C314CD81-1E67-E862-2E0D-EA4C8E62FDD2}" dt="2023-03-27T12:55:33.670" v="21" actId="20577"/>
-        <pc:sldMkLst>
-          <pc:docMk/>
-          <pc:sldMk cId="0" sldId="258"/>
-        </pc:sldMkLst>
-        <pc:spChg chg="mod">
-          <ac:chgData name="von Oheimb, David (T CST SEA-DE)" userId="S::david.von.oheimb@siemens.com::b10a0893-f9d8-434b-a5e8-6ee626ba9448" providerId="AD" clId="Web-{C314CD81-1E67-E862-2E0D-EA4C8E62FDD2}" dt="2023-03-27T12:55:33.670" v="21" actId="20577"/>
-          <ac:spMkLst>
-            <pc:docMk/>
-            <pc:sldMk cId="0" sldId="258"/>
-            <ac:spMk id="170" creationId="{00000000-0000-0000-0000-000000000000}"/>
-          </ac:spMkLst>
-        </pc:spChg>
-        <pc:extLst>
-          <p:ext xmlns:p="http://schemas.openxmlformats.org/presentationml/2006/main" uri="{D6D511B9-2390-475A-947B-AFAB55BFBCF1}">
-            <pc226:cmChg xmlns:pc226="http://schemas.microsoft.com/office/powerpoint/2022/06/main/command" chg="mod">
-              <pc226:chgData name="von Oheimb, David (T CST SEA-DE)" userId="S::david.von.oheimb@siemens.com::b10a0893-f9d8-434b-a5e8-6ee626ba9448" providerId="AD" clId="Web-{C314CD81-1E67-E862-2E0D-EA4C8E62FDD2}" dt="2023-03-27T12:53:31.275" v="20" actId="20577"/>
-              <pc2:cmMkLst xmlns:pc2="http://schemas.microsoft.com/office/powerpoint/2019/9/main/command">
-                <pc:docMk/>
-                <pc:sldMk cId="0" sldId="258"/>
-                <pc2:cmMk id="{A8DD131E-8A18-4BDD-A4DC-309C022DD210}"/>
-              </pc2:cmMkLst>
-            </pc226:cmChg>
-            <pc226:cmChg xmlns:pc226="http://schemas.microsoft.com/office/powerpoint/2022/06/main/command" chg="add mod">
-              <pc226:chgData name="von Oheimb, David (T CST SEA-DE)" userId="S::david.von.oheimb@siemens.com::b10a0893-f9d8-434b-a5e8-6ee626ba9448" providerId="AD" clId="Web-{C314CD81-1E67-E862-2E0D-EA4C8E62FDD2}" dt="2023-03-27T12:53:31.275" v="20" actId="20577"/>
-              <pc2:cmMkLst xmlns:pc2="http://schemas.microsoft.com/office/powerpoint/2019/9/main/command">
-                <pc:docMk/>
-                <pc:sldMk cId="0" sldId="258"/>
-                <pc2:cmMk id="{6D20526A-12E0-43AC-9FE5-64319E8B15A1}"/>
-              </pc2:cmMkLst>
-            </pc226:cmChg>
-            <pc226:cmChg xmlns:pc226="http://schemas.microsoft.com/office/powerpoint/2022/06/main/command" chg="add">
-              <pc226:chgData name="von Oheimb, David (T CST SEA-DE)" userId="S::david.von.oheimb@siemens.com::b10a0893-f9d8-434b-a5e8-6ee626ba9448" providerId="AD" clId="Web-{C314CD81-1E67-E862-2E0D-EA4C8E62FDD2}" dt="2023-03-27T12:52:08.507" v="14"/>
-              <pc2:cmMkLst xmlns:pc2="http://schemas.microsoft.com/office/powerpoint/2019/9/main/command">
-                <pc:docMk/>
-                <pc:sldMk cId="0" sldId="258"/>
-                <pc2:cmMk id="{892552DA-F3E4-4196-BDB0-021A4453AA8C}"/>
-              </pc2:cmMkLst>
-            </pc226:cmChg>
-          </p:ext>
-        </pc:extLst>
-      </pc:sldChg>
-    </pc:docChg>
-  </pc:docChgLst>
-  <pc:docChgLst>
-    <pc:chgData name="Fries, Steffen (T CST)" userId="S::steffen.fries@siemens.com::2c01e50f-f01d-49c1-bca8-a6b63bdf4e07" providerId="AD" clId="Web-{7162B8FA-8257-B959-3E58-6F1DA1A88B4B}"/>
-    <pc:docChg chg="mod modSld">
-      <pc:chgData name="Fries, Steffen (T CST)" userId="S::steffen.fries@siemens.com::2c01e50f-f01d-49c1-bca8-a6b63bdf4e07" providerId="AD" clId="Web-{7162B8FA-8257-B959-3E58-6F1DA1A88B4B}" dt="2023-03-27T10:05:11.966" v="135" actId="20577"/>
-      <pc:docMkLst>
-        <pc:docMk/>
-      </pc:docMkLst>
-      <pc:sldChg chg="modCm">
-        <pc:chgData name="Fries, Steffen (T CST)" userId="S::steffen.fries@siemens.com::2c01e50f-f01d-49c1-bca8-a6b63bdf4e07" providerId="AD" clId="Web-{7162B8FA-8257-B959-3E58-6F1DA1A88B4B}" dt="2023-03-27T10:01:48.520" v="114"/>
-        <pc:sldMkLst>
-          <pc:docMk/>
-          <pc:sldMk cId="0" sldId="256"/>
-        </pc:sldMkLst>
-        <pc:extLst>
-          <p:ext xmlns:p="http://schemas.openxmlformats.org/presentationml/2006/main" uri="{D6D511B9-2390-475A-947B-AFAB55BFBCF1}">
-            <pc226:cmChg xmlns:pc226="http://schemas.microsoft.com/office/powerpoint/2022/06/main/command" chg="">
-              <pc226:chgData name="Fries, Steffen (T CST)" userId="S::steffen.fries@siemens.com::2c01e50f-f01d-49c1-bca8-a6b63bdf4e07" providerId="AD" clId="Web-{7162B8FA-8257-B959-3E58-6F1DA1A88B4B}" dt="2023-03-27T10:01:48.520" v="114"/>
-              <pc2:cmMkLst xmlns:pc2="http://schemas.microsoft.com/office/powerpoint/2019/9/main/command">
-                <pc:docMk/>
-                <pc:sldMk cId="0" sldId="256"/>
-                <pc2:cmMk id="{122C0F50-4686-4ADC-AB2A-B53A7E3DA984}"/>
-              </pc2:cmMkLst>
-              <pc226:cmRplyChg chg="add">
-                <pc226:chgData name="Fries, Steffen (T CST)" userId="S::steffen.fries@siemens.com::2c01e50f-f01d-49c1-bca8-a6b63bdf4e07" providerId="AD" clId="Web-{7162B8FA-8257-B959-3E58-6F1DA1A88B4B}" dt="2023-03-27T10:01:48.520" v="114"/>
-                <pc2:cmRplyMkLst xmlns:pc2="http://schemas.microsoft.com/office/powerpoint/2019/9/main/command">
-                  <pc:docMk/>
-                  <pc:sldMk cId="0" sldId="256"/>
-                  <pc2:cmMk id="{122C0F50-4686-4ADC-AB2A-B53A7E3DA984}"/>
-                  <pc2:cmRplyMk id="{FDBC8335-6EFF-414F-8975-049AD8EFB235}"/>
-                </pc2:cmRplyMkLst>
-              </pc226:cmRplyChg>
-            </pc226:cmChg>
-          </p:ext>
-        </pc:extLst>
-      </pc:sldChg>
-      <pc:sldChg chg="modSp modCm">
-        <pc:chgData name="Fries, Steffen (T CST)" userId="S::steffen.fries@siemens.com::2c01e50f-f01d-49c1-bca8-a6b63bdf4e07" providerId="AD" clId="Web-{7162B8FA-8257-B959-3E58-6F1DA1A88B4B}" dt="2023-03-27T10:05:11.966" v="135" actId="20577"/>
-        <pc:sldMkLst>
-          <pc:docMk/>
-          <pc:sldMk cId="0" sldId="258"/>
-        </pc:sldMkLst>
-        <pc:spChg chg="mod">
-          <ac:chgData name="Fries, Steffen (T CST)" userId="S::steffen.fries@siemens.com::2c01e50f-f01d-49c1-bca8-a6b63bdf4e07" providerId="AD" clId="Web-{7162B8FA-8257-B959-3E58-6F1DA1A88B4B}" dt="2023-03-27T09:31:02.155" v="1" actId="20577"/>
-          <ac:spMkLst>
-            <pc:docMk/>
-            <pc:sldMk cId="0" sldId="258"/>
-            <ac:spMk id="169" creationId="{00000000-0000-0000-0000-000000000000}"/>
-          </ac:spMkLst>
-        </pc:spChg>
-        <pc:spChg chg="mod">
-          <ac:chgData name="Fries, Steffen (T CST)" userId="S::steffen.fries@siemens.com::2c01e50f-f01d-49c1-bca8-a6b63bdf4e07" providerId="AD" clId="Web-{7162B8FA-8257-B959-3E58-6F1DA1A88B4B}" dt="2023-03-27T10:05:11.966" v="135" actId="20577"/>
-          <ac:spMkLst>
-            <pc:docMk/>
-            <pc:sldMk cId="0" sldId="258"/>
-            <ac:spMk id="170" creationId="{00000000-0000-0000-0000-000000000000}"/>
-          </ac:spMkLst>
-        </pc:spChg>
-        <pc:extLst>
-          <p:ext xmlns:p="http://schemas.openxmlformats.org/presentationml/2006/main" uri="{D6D511B9-2390-475A-947B-AFAB55BFBCF1}">
-            <pc226:cmChg xmlns:pc226="http://schemas.microsoft.com/office/powerpoint/2022/06/main/command" chg="mod">
-              <pc226:chgData name="Fries, Steffen (T CST)" userId="S::steffen.fries@siemens.com::2c01e50f-f01d-49c1-bca8-a6b63bdf4e07" providerId="AD" clId="Web-{7162B8FA-8257-B959-3E58-6F1DA1A88B4B}" dt="2023-03-27T10:05:07.637" v="134" actId="20577"/>
-              <pc2:cmMkLst xmlns:pc2="http://schemas.microsoft.com/office/powerpoint/2019/9/main/command">
-                <pc:docMk/>
-                <pc:sldMk cId="0" sldId="258"/>
-                <pc2:cmMk id="{A8DD131E-8A18-4BDD-A4DC-309C022DD210}"/>
-              </pc2:cmMkLst>
-              <pc226:cmRplyChg chg="add">
-                <pc226:chgData name="Fries, Steffen (T CST)" userId="S::steffen.fries@siemens.com::2c01e50f-f01d-49c1-bca8-a6b63bdf4e07" providerId="AD" clId="Web-{7162B8FA-8257-B959-3E58-6F1DA1A88B4B}" dt="2023-03-27T10:03:36.868" v="121"/>
-                <pc2:cmRplyMkLst xmlns:pc2="http://schemas.microsoft.com/office/powerpoint/2019/9/main/command">
-                  <pc:docMk/>
-                  <pc:sldMk cId="0" sldId="258"/>
-                  <pc2:cmMk id="{A8DD131E-8A18-4BDD-A4DC-309C022DD210}"/>
-                  <pc2:cmRplyMk id="{F06FA5D0-BA08-44D8-B64F-B2730655FE85}"/>
-                </pc2:cmRplyMkLst>
-              </pc226:cmRplyChg>
-            </pc226:cmChg>
-            <pc226:cmChg xmlns:pc226="http://schemas.microsoft.com/office/powerpoint/2022/06/main/command" chg="mod">
-              <pc226:chgData name="Fries, Steffen (T CST)" userId="S::steffen.fries@siemens.com::2c01e50f-f01d-49c1-bca8-a6b63bdf4e07" providerId="AD" clId="Web-{7162B8FA-8257-B959-3E58-6F1DA1A88B4B}" dt="2023-03-27T10:02:08.583" v="115"/>
-              <pc2:cmMkLst xmlns:pc2="http://schemas.microsoft.com/office/powerpoint/2019/9/main/command">
-                <pc:docMk/>
-                <pc:sldMk cId="0" sldId="258"/>
-                <pc2:cmMk id="{00C0FA8A-699F-4FC0-8C28-C30B5B8B823B}"/>
-              </pc2:cmMkLst>
-              <pc226:cmRplyChg chg="add">
-                <pc226:chgData name="Fries, Steffen (T CST)" userId="S::steffen.fries@siemens.com::2c01e50f-f01d-49c1-bca8-a6b63bdf4e07" providerId="AD" clId="Web-{7162B8FA-8257-B959-3E58-6F1DA1A88B4B}" dt="2023-03-27T10:02:08.583" v="115"/>
-                <pc2:cmRplyMkLst xmlns:pc2="http://schemas.microsoft.com/office/powerpoint/2019/9/main/command">
-                  <pc:docMk/>
-                  <pc:sldMk cId="0" sldId="258"/>
-                  <pc2:cmMk id="{00C0FA8A-699F-4FC0-8C28-C30B5B8B823B}"/>
-                  <pc2:cmRplyMk id="{F4BB8878-720F-4E09-A877-2F50E55C129C}"/>
-                </pc2:cmRplyMkLst>
-              </pc226:cmRplyChg>
-            </pc226:cmChg>
-          </p:ext>
-        </pc:extLst>
-      </pc:sldChg>
-    </pc:docChg>
-  </pc:docChgLst>
-</pc:chgInfo>
 </file>
 
 <file path=ppt/notesMasters/notesMaster1.xml><?xml version="1.0" encoding="utf-8"?>
@@ -3721,8 +3517,8 @@
         </p:nvSpPr>
         <p:spPr>
           <a:xfrm>
-            <a:off x="746235" y="1401798"/>
-            <a:ext cx="11214538" cy="4907576"/>
+            <a:off x="649983" y="1532021"/>
+            <a:ext cx="11214538" cy="4876800"/>
           </a:xfrm>
           <a:prstGeom prst="rect">
             <a:avLst/>
@@ -3750,13 +3546,15 @@
           </a:bodyPr>
           <a:lstStyle/>
           <a:p>
-            <a:pPr>
+            <a:pPr marL="342900" indent="-342900">
               <a:lnSpc>
                 <a:spcPct val="100000"/>
               </a:lnSpc>
+              <a:buFont typeface="Arial" panose="020B0604020202020204" pitchFamily="34" charset="0"/>
+              <a:buChar char="•"/>
             </a:pPr>
             <a:r>
-              <a:rPr lang="en-US" sz="2100" b="0" strike="noStrike" spc="-1" dirty="0">
+              <a:rPr lang="en-US" sz="2000" b="0" strike="noStrike" spc="-1" dirty="0">
                 <a:solidFill>
                   <a:srgbClr val="000000"/>
                 </a:solidFill>
@@ -3764,10 +3562,10 @@
                 <a:ea typeface="DejaVu Sans"/>
                 <a:cs typeface="Calibri"/>
               </a:rPr>
-              <a:t>WGLC had ended on April 3</a:t>
-            </a:r>
-            <a:r>
-              <a:rPr lang="en-US" sz="2100" b="0" strike="noStrike" spc="-1" baseline="30000" dirty="0">
+              <a:t>WGLC ended April 3</a:t>
+            </a:r>
+            <a:r>
+              <a:rPr lang="en-US" sz="2000" b="0" strike="noStrike" spc="-1" baseline="30000" dirty="0">
                 <a:solidFill>
                   <a:srgbClr val="000000"/>
                 </a:solidFill>
@@ -3777,29 +3575,26 @@
               </a:rPr>
               <a:t>rd</a:t>
             </a:r>
-            <a:br>
-              <a:rPr lang="en-GB" sz="2100" b="0" strike="noStrike" spc="-1" baseline="30000" dirty="0">
-                <a:solidFill>
-                  <a:srgbClr val="000000"/>
-                </a:solidFill>
-                <a:latin typeface="Calibri"/>
-                <a:ea typeface="DejaVu Sans"/>
-                <a:cs typeface="Calibri"/>
-              </a:rPr>
-            </a:br>
-            <a:r>
-              <a:rPr lang="en-GB" sz="2100" spc="-1" dirty="0">
+            <a:r>
+              <a:rPr lang="en-GB" sz="2000" spc="-1" dirty="0">
                 <a:solidFill>
                   <a:srgbClr val="000000"/>
                 </a:solidFill>
                 <a:latin typeface="Calibri"/>
                 <a:cs typeface="Calibri"/>
               </a:rPr>
-              <a:t>All comments and suggestions already addressed before IETF 117</a:t>
-            </a:r>
-          </a:p>
-          <a:p>
-            <a:endParaRPr lang="en-GB" sz="2100" spc="-1" dirty="0">
+              <a:t>; all comments and suggestions addressed before IETF 117</a:t>
+            </a:r>
+            <a:br>
+              <a:rPr lang="en-GB" sz="2000" spc="-1" dirty="0">
+                <a:solidFill>
+                  <a:srgbClr val="000000"/>
+                </a:solidFill>
+                <a:latin typeface="Calibri"/>
+                <a:cs typeface="Calibri"/>
+              </a:rPr>
+            </a:br>
+            <a:endParaRPr lang="en-GB" sz="2000" spc="-1" dirty="0">
               <a:solidFill>
                 <a:srgbClr val="000000"/>
               </a:solidFill>
@@ -3808,130 +3603,104 @@
             </a:endParaRPr>
           </a:p>
           <a:p>
-            <a:r>
-              <a:rPr lang="en-US" sz="2100" spc="-1" dirty="0">
+            <a:pPr marL="342900" indent="-342900">
+              <a:lnSpc>
+                <a:spcPct val="100000"/>
+              </a:lnSpc>
+              <a:buFont typeface="Arial" panose="020B0604020202020204" pitchFamily="34" charset="0"/>
+              <a:buChar char="•"/>
+            </a:pPr>
+            <a:r>
+              <a:rPr lang="en-US" sz="2000" spc="-1" dirty="0">
                 <a:solidFill>
                   <a:srgbClr val="000000"/>
                 </a:solidFill>
                 <a:latin typeface="Calibri"/>
                 <a:cs typeface="Calibri"/>
               </a:rPr>
-              <a:t>Since then, one open issue: how to handle discovery of registrars and their BRSKI-AE support </a:t>
-            </a:r>
-          </a:p>
-          <a:p>
-            <a:pPr indent="-342900">
-              <a:buFontTx/>
-              <a:buChar char="-"/>
+              <a:t>Open issue: </a:t>
+            </a:r>
+          </a:p>
+          <a:p>
+            <a:pPr marL="800100" lvl="1" indent="-342900">
+              <a:buFont typeface="Arial" panose="020B0604020202020204" pitchFamily="34" charset="0"/>
+              <a:buChar char="•"/>
             </a:pPr>
             <a:r>
-              <a:rPr lang="en-US" sz="2100" spc="-1" dirty="0">
+              <a:rPr lang="en-US" sz="2000" spc="-1" dirty="0">
                 <a:solidFill>
                   <a:srgbClr val="000000"/>
                 </a:solidFill>
                 <a:latin typeface="Calibri"/>
                 <a:cs typeface="Calibri"/>
               </a:rPr>
-              <a:t>In engineered environments, should be sufficient to use discovery as in RFC 8995</a:t>
-            </a:r>
-            <a:br>
-              <a:rPr lang="en-US" sz="2100" spc="-1" dirty="0">
+              <a:t>Discovery of registrars with BRSKI-AE capabilities</a:t>
+            </a:r>
+          </a:p>
+          <a:p>
+            <a:r>
+              <a:rPr lang="en-US" sz="2000" spc="-1" dirty="0">
                 <a:solidFill>
                   <a:srgbClr val="000000"/>
                 </a:solidFill>
                 <a:latin typeface="Calibri"/>
                 <a:cs typeface="Calibri"/>
               </a:rPr>
-            </a:br>
-            <a:r>
-              <a:rPr lang="en-US" sz="2100" spc="-1" dirty="0">
+              <a:t>     Proposed approach (Design Team):</a:t>
+            </a:r>
+          </a:p>
+          <a:p>
+            <a:pPr marL="800100" lvl="1" indent="-342900">
+              <a:buFont typeface="Arial" panose="020B0604020202020204" pitchFamily="34" charset="0"/>
+              <a:buChar char="•"/>
+            </a:pPr>
+            <a:r>
+              <a:rPr lang="en-US" sz="2000" spc="-1" dirty="0">
                 <a:solidFill>
                   <a:srgbClr val="000000"/>
                 </a:solidFill>
                 <a:latin typeface="Calibri"/>
                 <a:cs typeface="Calibri"/>
               </a:rPr>
-              <a:t>      Motivation for this minimalist approach:</a:t>
-            </a:r>
-          </a:p>
-          <a:p>
-            <a:pPr lvl="2" indent="-342900">
-              <a:buFontTx/>
-              <a:buChar char="-"/>
-            </a:pPr>
-            <a:r>
-              <a:rPr lang="en-US" sz="2100" spc="-1" dirty="0">
+              <a:t>In engineered environments, use discovery as specified in RFC 8995,</a:t>
+            </a:r>
+            <a:br>
+              <a:rPr lang="en-US" sz="2000" spc="-1" dirty="0">
                 <a:solidFill>
                   <a:srgbClr val="000000"/>
                 </a:solidFill>
                 <a:latin typeface="Calibri"/>
                 <a:cs typeface="Calibri"/>
               </a:rPr>
-              <a:t>no extra requirements and implementation effort regarding discovery in simple cases</a:t>
-            </a:r>
-          </a:p>
-          <a:p>
-            <a:pPr lvl="2" indent="-342900">
-              <a:buFontTx/>
-              <a:buChar char="-"/>
-            </a:pPr>
-            <a:r>
-              <a:rPr lang="en-US" sz="2100" spc="-1" dirty="0">
+            </a:br>
+            <a:r>
+              <a:rPr lang="en-US" sz="2000" spc="-1" dirty="0">
                 <a:solidFill>
                   <a:srgbClr val="000000"/>
                 </a:solidFill>
                 <a:latin typeface="Calibri"/>
                 <a:cs typeface="Calibri"/>
               </a:rPr>
-              <a:t>move on finalizing BRSKI-AE draft without having to wait for upcoming specifications</a:t>
-            </a:r>
-          </a:p>
-          <a:p>
-            <a:pPr indent="-342900">
-              <a:buFontTx/>
-              <a:buChar char="-"/>
+              <a:t>assuming a-priori knowledge of functionality and supported enrollment protocol. </a:t>
+            </a:r>
+          </a:p>
+          <a:p>
+            <a:pPr marL="800100" lvl="1" indent="-342900">
+              <a:buFont typeface="Arial" panose="020B0604020202020204" pitchFamily="34" charset="0"/>
+              <a:buChar char="•"/>
             </a:pPr>
             <a:r>
-              <a:rPr lang="en-US" sz="2100" spc="-1" dirty="0">
+              <a:rPr lang="en-US" sz="2000" spc="-1" dirty="0">
                 <a:solidFill>
                   <a:srgbClr val="000000"/>
                 </a:solidFill>
                 <a:latin typeface="Calibri"/>
                 <a:cs typeface="Calibri"/>
               </a:rPr>
-              <a:t>For heterogeneous scenarios, a more general solution is being defined: [BRSKI-Discovery]</a:t>
-            </a:r>
-            <a:br>
-              <a:rPr lang="en-US" sz="2100" spc="-1" dirty="0">
-                <a:solidFill>
-                  <a:srgbClr val="000000"/>
-                </a:solidFill>
-                <a:latin typeface="Calibri"/>
-                <a:cs typeface="Calibri"/>
-              </a:rPr>
-            </a:br>
-            <a:r>
-              <a:rPr lang="en-US" sz="2100" spc="-1" dirty="0">
-                <a:solidFill>
-                  <a:srgbClr val="000000"/>
-                </a:solidFill>
-                <a:latin typeface="Calibri"/>
-                <a:cs typeface="Calibri"/>
-              </a:rPr>
-              <a:t>      </a:t>
-            </a:r>
-            <a:r>
-              <a:rPr lang="en-US" sz="2100" i="1" spc="-1" dirty="0">
-                <a:solidFill>
-                  <a:srgbClr val="000000"/>
-                </a:solidFill>
-                <a:latin typeface="Calibri"/>
-                <a:cs typeface="Calibri"/>
-              </a:rPr>
-              <a:t>Discovery for BRSKI variations </a:t>
-            </a:r>
-            <a:r>
-              <a:rPr lang="en-US" sz="2100" spc="-1" dirty="0">
+              <a:t>For heterogeneous scenarios, a more general solution is being defined: </a:t>
+            </a:r>
+            <a:r>
+              <a:rPr lang="en-US" sz="2000" spc="-1" dirty="0">
                 <a:solidFill>
                   <a:srgbClr val="000000"/>
                 </a:solidFill>
@@ -3939,9 +3708,9 @@
                 <a:cs typeface="Calibri"/>
                 <a:hlinkClick r:id="rId3"/>
               </a:rPr>
-              <a:t>https://datatracker.ietf.org/doc/draft-eckert-anima-brski-discovery/</a:t>
-            </a:r>
-            <a:endParaRPr lang="en-US" sz="2100" spc="-1" dirty="0">
+              <a:t>BRSKI-Discovery</a:t>
+            </a:r>
+            <a:endParaRPr lang="en-US" sz="2000" spc="-1" dirty="0">
               <a:solidFill>
                 <a:srgbClr val="000000"/>
               </a:solidFill>
@@ -3950,28 +3719,73 @@
             </a:endParaRPr>
           </a:p>
           <a:p>
-            <a:pPr>
-              <a:lnSpc>
-                <a:spcPct val="100000"/>
-              </a:lnSpc>
+            <a:pPr marL="800100" lvl="1" indent="-342900">
+              <a:buFont typeface="Arial" panose="020B0604020202020204" pitchFamily="34" charset="0"/>
+              <a:buChar char="•"/>
             </a:pPr>
-            <a:endParaRPr lang="en-US" sz="2100" b="0" strike="noStrike" spc="-1" dirty="0">
+            <a:r>
+              <a:rPr lang="en-US" sz="2000" spc="-1" dirty="0">
+                <a:solidFill>
+                  <a:srgbClr val="000000"/>
+                </a:solidFill>
+                <a:latin typeface="Calibri"/>
+                <a:cs typeface="Calibri"/>
+              </a:rPr>
+              <a:t>This avoids extra requirements and implementation effort regarding discovery in simple cases</a:t>
+            </a:r>
+            <a:br>
+              <a:rPr lang="en-US" sz="2000" spc="-1">
+                <a:solidFill>
+                  <a:srgbClr val="000000"/>
+                </a:solidFill>
+                <a:latin typeface="Calibri"/>
+                <a:cs typeface="Calibri"/>
+              </a:rPr>
+            </a:br>
+            <a:r>
+              <a:rPr lang="en-US" sz="2000" spc="-1">
+                <a:solidFill>
+                  <a:srgbClr val="000000"/>
+                </a:solidFill>
+                <a:latin typeface="Calibri"/>
+                <a:cs typeface="Calibri"/>
+              </a:rPr>
+              <a:t>and allows </a:t>
+            </a:r>
+            <a:r>
+              <a:rPr lang="en-US" sz="2000" spc="-1" dirty="0">
+                <a:solidFill>
+                  <a:srgbClr val="000000"/>
+                </a:solidFill>
+                <a:latin typeface="Calibri"/>
+                <a:cs typeface="Calibri"/>
+              </a:rPr>
+              <a:t>finalization of BRSKI-AE and further BRSKI enhancements, while referencing a more versatile approach.</a:t>
+            </a:r>
+            <a:br>
+              <a:rPr lang="en-US" sz="2000" spc="-1" dirty="0">
+                <a:solidFill>
+                  <a:srgbClr val="000000"/>
+                </a:solidFill>
+                <a:latin typeface="Calibri"/>
+                <a:cs typeface="Calibri"/>
+              </a:rPr>
+            </a:br>
+            <a:endParaRPr lang="en-US" sz="2000" spc="-1" dirty="0">
               <a:solidFill>
                 <a:srgbClr val="000000"/>
               </a:solidFill>
-              <a:latin typeface="Calibri" panose="020F0502020204030204" pitchFamily="34" charset="0"/>
-              <a:ea typeface="DejaVu Sans"/>
-              <a:cs typeface="Calibri" panose="020F0502020204030204" pitchFamily="34" charset="0"/>
-            </a:endParaRPr>
-          </a:p>
-          <a:p>
-            <a:pPr>
-              <a:lnSpc>
-                <a:spcPct val="100000"/>
-              </a:lnSpc>
+              <a:latin typeface="Calibri"/>
+              <a:cs typeface="Calibri"/>
+            </a:endParaRPr>
+          </a:p>
+          <a:p>
+            <a:pPr marL="342900" indent="-342900">
+              <a:buFont typeface="Arial" panose="020B0604020202020204" pitchFamily="34" charset="0"/>
+              <a:buChar char="•"/>
             </a:pPr>
             <a:r>
-              <a:rPr lang="en-US" sz="2100" b="0" strike="noStrike" spc="-1" dirty="0">
+              <a:rPr lang="en-US" sz="2000" b="0" strike="noStrike" spc="-1" dirty="0">
                 <a:solidFill>
                   <a:srgbClr val="000000"/>
                 </a:solidFill>
@@ -3979,55 +3793,52 @@
                 <a:ea typeface="DejaVu Sans"/>
                 <a:cs typeface="Calibri"/>
               </a:rPr>
-              <a:t>Changelog from draft-ae-05 to draft-ae-06: 	</a:t>
-            </a:r>
-          </a:p>
-          <a:p>
-            <a:pPr marL="342900" indent="-342900">
-              <a:buFontTx/>
-              <a:buChar char="-"/>
+              <a:t>Changelog from version 05 to 06: 	</a:t>
+            </a:r>
+          </a:p>
+          <a:p>
+            <a:pPr marL="800100" lvl="1" indent="-342900">
+              <a:buFont typeface="Arial" panose="020B0604020202020204" pitchFamily="34" charset="0"/>
+              <a:buChar char="•"/>
             </a:pPr>
             <a:r>
-              <a:rPr lang="en-US" sz="2100" spc="-1" dirty="0">
+              <a:rPr lang="en-US" sz="2000" spc="-1" dirty="0">
                 <a:solidFill>
                   <a:srgbClr val="000000"/>
                 </a:solidFill>
                 <a:latin typeface="Calibri"/>
-                <a:ea typeface="DejaVu Sans"/>
                 <a:cs typeface="Calibri"/>
               </a:rPr>
               <a:t>Extend section on discovery according to discussion in the BRSKI design team</a:t>
             </a:r>
           </a:p>
           <a:p>
-            <a:pPr marL="342900" indent="-342900">
-              <a:buFontTx/>
-              <a:buChar char="-"/>
+            <a:pPr marL="800100" lvl="1" indent="-342900">
+              <a:buFont typeface="Arial" panose="020B0604020202020204" pitchFamily="34" charset="0"/>
+              <a:buChar char="•"/>
             </a:pPr>
             <a:r>
-              <a:rPr lang="en-US" sz="2100" spc="-1" dirty="0">
+              <a:rPr lang="en-US" sz="2000" spc="-1" dirty="0">
                 <a:solidFill>
                   <a:srgbClr val="000000"/>
                 </a:solidFill>
                 <a:latin typeface="Calibri"/>
-                <a:ea typeface="DejaVu Sans"/>
                 <a:cs typeface="Calibri"/>
               </a:rPr>
               <a:t>Make explicit that MASA voucher status telemetry is as in BRSKI</a:t>
             </a:r>
           </a:p>
           <a:p>
-            <a:pPr marL="342900" indent="-342900">
-              <a:buFontTx/>
-              <a:buChar char="-"/>
+            <a:pPr marL="800100" lvl="1" indent="-342900">
+              <a:buFont typeface="Arial" panose="020B0604020202020204" pitchFamily="34" charset="0"/>
+              <a:buChar char="•"/>
             </a:pPr>
             <a:r>
-              <a:rPr lang="en-US" sz="2100" spc="-1" dirty="0">
+              <a:rPr lang="en-US" sz="2000" spc="-1" dirty="0">
                 <a:solidFill>
                   <a:srgbClr val="000000"/>
                 </a:solidFill>
                 <a:latin typeface="Calibri"/>
-                <a:ea typeface="DejaVu Sans"/>
                 <a:cs typeface="Calibri"/>
               </a:rPr>
               <a:t>Add a note that on delegation, RA may need info on pledge authorization</a:t>
@@ -4370,18 +4181,45 @@
                 <a:latin typeface="Calibri"/>
                 <a:ea typeface="DejaVu Sans"/>
               </a:rPr>
-              <a:t>WGLC ended on April 3</a:t>
-            </a:r>
-            <a:r>
-              <a:rPr lang="en-US" sz="2400" b="0" strike="noStrike" spc="-1" baseline="30000" dirty="0">
+              <a:t>WGLC ended on </a:t>
+            </a:r>
+            <a:r>
+              <a:rPr lang="en-US" sz="2400" b="0" strike="noStrike" spc="-1">
                 <a:solidFill>
                   <a:srgbClr val="000000"/>
                 </a:solidFill>
                 <a:latin typeface="Calibri"/>
                 <a:ea typeface="DejaVu Sans"/>
               </a:rPr>
-              <a:t>rd</a:t>
-            </a:r>
+              <a:t>April 3</a:t>
+            </a:r>
+            <a:r>
+              <a:rPr lang="en-US" sz="2400" b="0" strike="noStrike" spc="-1" baseline="30000">
+                <a:solidFill>
+                  <a:srgbClr val="000000"/>
+                </a:solidFill>
+                <a:latin typeface="Calibri"/>
+                <a:ea typeface="DejaVu Sans"/>
+              </a:rPr>
+              <a:t>rd </a:t>
+            </a:r>
+            <a:r>
+              <a:rPr lang="en-US" sz="2400" b="0" strike="noStrike" spc="-1">
+                <a:solidFill>
+                  <a:srgbClr val="000000"/>
+                </a:solidFill>
+                <a:latin typeface="OpenSymbol"/>
+                <a:ea typeface="OpenSymbol"/>
+              </a:rPr>
+              <a:t>✓</a:t>
+            </a:r>
+            <a:endParaRPr lang="en-US" sz="2400" b="0" strike="noStrike" spc="-1" baseline="30000" dirty="0">
+              <a:solidFill>
+                <a:srgbClr val="000000"/>
+              </a:solidFill>
+              <a:latin typeface="Calibri"/>
+              <a:ea typeface="DejaVu Sans"/>
+            </a:endParaRPr>
           </a:p>
           <a:p>
             <a:pPr marL="228600" indent="-225360">

</xml_diff>

<commit_message>
slides-118-BRSKI-AE.pptx: update after comments by Hendrik
</commit_message>
<xml_diff>
--- a/presentations/slides-118-BRSKI-AE.pptx
+++ b/presentations/slides-118-BRSKI-AE.pptx
@@ -3585,22 +3585,6 @@
               </a:rPr>
               <a:t>; all comments and suggestions addressed before IETF 117</a:t>
             </a:r>
-            <a:br>
-              <a:rPr lang="en-GB" sz="2000" spc="-1" dirty="0">
-                <a:solidFill>
-                  <a:srgbClr val="000000"/>
-                </a:solidFill>
-                <a:latin typeface="Calibri"/>
-                <a:cs typeface="Calibri"/>
-              </a:rPr>
-            </a:br>
-            <a:endParaRPr lang="en-GB" sz="2000" spc="-1" dirty="0">
-              <a:solidFill>
-                <a:srgbClr val="000000"/>
-              </a:solidFill>
-              <a:latin typeface="Calibri"/>
-              <a:cs typeface="Calibri"/>
-            </a:endParaRPr>
           </a:p>
           <a:p>
             <a:pPr marL="342900" indent="-342900">
@@ -3611,14 +3595,92 @@
               <a:buChar char="•"/>
             </a:pPr>
             <a:r>
-              <a:rPr lang="en-US" sz="2000" spc="-1" dirty="0">
+              <a:rPr lang="en-GB" sz="2000" spc="-1" dirty="0">
                 <a:solidFill>
                   <a:srgbClr val="000000"/>
                 </a:solidFill>
                 <a:latin typeface="Calibri"/>
                 <a:cs typeface="Calibri"/>
               </a:rPr>
-              <a:t>Open issue: </a:t>
+              <a:t>Yangdoctors review updated on Aug 31</a:t>
+            </a:r>
+            <a:r>
+              <a:rPr lang="en-GB" sz="2000" spc="-1" baseline="30000" dirty="0">
+                <a:solidFill>
+                  <a:srgbClr val="000000"/>
+                </a:solidFill>
+                <a:latin typeface="Calibri"/>
+                <a:cs typeface="Calibri"/>
+              </a:rPr>
+              <a:t>st</a:t>
+            </a:r>
+            <a:r>
+              <a:rPr lang="en-GB" sz="2000" spc="-1" dirty="0">
+                <a:solidFill>
+                  <a:srgbClr val="000000"/>
+                </a:solidFill>
+                <a:latin typeface="Calibri"/>
+                <a:cs typeface="Calibri"/>
+              </a:rPr>
+              <a:t>; result: Ready</a:t>
+            </a:r>
+          </a:p>
+          <a:p>
+            <a:pPr marL="342900" indent="-342900">
+              <a:lnSpc>
+                <a:spcPct val="100000"/>
+              </a:lnSpc>
+              <a:buFont typeface="Arial" panose="020B0604020202020204" pitchFamily="34" charset="0"/>
+              <a:buChar char="•"/>
+            </a:pPr>
+            <a:r>
+              <a:rPr lang="en-GB" sz="2000" spc="-1" dirty="0">
+                <a:solidFill>
+                  <a:srgbClr val="000000"/>
+                </a:solidFill>
+                <a:latin typeface="Calibri"/>
+                <a:cs typeface="Calibri"/>
+              </a:rPr>
+              <a:t>SECDIR Last Call Review requested on Aug 7</a:t>
+            </a:r>
+            <a:r>
+              <a:rPr lang="en-GB" sz="2000" spc="-1" baseline="30000" dirty="0">
+                <a:solidFill>
+                  <a:srgbClr val="000000"/>
+                </a:solidFill>
+                <a:latin typeface="Calibri"/>
+                <a:cs typeface="Calibri"/>
+              </a:rPr>
+              <a:t>th</a:t>
+            </a:r>
+            <a:r>
+              <a:rPr lang="en-GB" sz="2000" spc="-1" dirty="0">
+                <a:solidFill>
+                  <a:srgbClr val="000000"/>
+                </a:solidFill>
+                <a:latin typeface="Calibri"/>
+                <a:cs typeface="Calibri"/>
+              </a:rPr>
+              <a:t>; status: review not complete yet</a:t>
+            </a:r>
+          </a:p>
+          <a:p>
+            <a:pPr marL="342900" indent="-342900">
+              <a:lnSpc>
+                <a:spcPct val="100000"/>
+              </a:lnSpc>
+              <a:buFont typeface="Arial" panose="020B0604020202020204" pitchFamily="34" charset="0"/>
+              <a:buChar char="•"/>
+            </a:pPr>
+            <a:r>
+              <a:rPr lang="en-US" sz="2000" spc="-1" dirty="0">
+                <a:solidFill>
+                  <a:srgbClr val="000000"/>
+                </a:solidFill>
+                <a:latin typeface="Calibri"/>
+                <a:cs typeface="Calibri"/>
+              </a:rPr>
+              <a:t>Only one open issue: </a:t>
             </a:r>
           </a:p>
           <a:p>
@@ -3634,7 +3696,7 @@
                 <a:latin typeface="Calibri"/>
                 <a:cs typeface="Calibri"/>
               </a:rPr>
-              <a:t>Discovery of registrars with BRSKI-AE capabilities</a:t>
+              <a:t>How to describe discovery of registrars with BRSKI-AE capabilities</a:t>
             </a:r>
           </a:p>
           <a:p>
@@ -3646,7 +3708,7 @@
                 <a:latin typeface="Calibri"/>
                 <a:cs typeface="Calibri"/>
               </a:rPr>
-              <a:t>     Proposed approach (Design Team):</a:t>
+              <a:t>     Proposed approach (discussed in Design Team):</a:t>
             </a:r>
           </a:p>
           <a:p>
@@ -3734,7 +3796,7 @@
               <a:t>This avoids extra requirements and implementation effort regarding discovery in simple cases</a:t>
             </a:r>
             <a:br>
-              <a:rPr lang="en-US" sz="2000" spc="-1">
+              <a:rPr lang="en-US" sz="2000" spc="-1" dirty="0">
                 <a:solidFill>
                   <a:srgbClr val="000000"/>
                 </a:solidFill>
@@ -3743,41 +3805,15 @@
               </a:rPr>
             </a:br>
             <a:r>
-              <a:rPr lang="en-US" sz="2000" spc="-1">
+              <a:rPr lang="en-US" sz="2000" spc="-1" dirty="0">
                 <a:solidFill>
                   <a:srgbClr val="000000"/>
                 </a:solidFill>
                 <a:latin typeface="Calibri"/>
                 <a:cs typeface="Calibri"/>
               </a:rPr>
-              <a:t>and allows </a:t>
-            </a:r>
-            <a:r>
-              <a:rPr lang="en-US" sz="2000" spc="-1" dirty="0">
-                <a:solidFill>
-                  <a:srgbClr val="000000"/>
-                </a:solidFill>
-                <a:latin typeface="Calibri"/>
-                <a:cs typeface="Calibri"/>
-              </a:rPr>
-              <a:t>finalization of BRSKI-AE and further BRSKI enhancements, while referencing a more versatile approach.</a:t>
-            </a:r>
-            <a:br>
-              <a:rPr lang="en-US" sz="2000" spc="-1" dirty="0">
-                <a:solidFill>
-                  <a:srgbClr val="000000"/>
-                </a:solidFill>
-                <a:latin typeface="Calibri"/>
-                <a:cs typeface="Calibri"/>
-              </a:rPr>
-            </a:br>
-            <a:endParaRPr lang="en-US" sz="2000" spc="-1" dirty="0">
-              <a:solidFill>
-                <a:srgbClr val="000000"/>
-              </a:solidFill>
-              <a:latin typeface="Calibri"/>
-              <a:cs typeface="Calibri"/>
-            </a:endParaRPr>
+              <a:t>and allows finalization of BRSKI-AE and further BRSKI enhancements, while referencing a more versatile approach.</a:t>
+            </a:r>
           </a:p>
           <a:p>
             <a:pPr marL="342900" indent="-342900">
@@ -3925,7 +3961,7 @@
               </a:tabLst>
             </a:pPr>
             <a:r>
-              <a:rPr lang="en-US" sz="2400" spc="-1" dirty="0">
+              <a:rPr lang="en-US" sz="2000" spc="-1" dirty="0">
                 <a:solidFill>
                   <a:schemeClr val="bg2">
                     <a:lumMod val="75000"/>
@@ -3951,7 +3987,7 @@
               </a:tabLst>
             </a:pPr>
             <a:r>
-              <a:rPr lang="en-US" sz="2400" spc="-1" dirty="0">
+              <a:rPr lang="en-US" sz="2000" spc="-1" dirty="0">
                 <a:solidFill>
                   <a:schemeClr val="bg2">
                     <a:lumMod val="75000"/>
@@ -3977,7 +4013,7 @@
               </a:tabLst>
             </a:pPr>
             <a:r>
-              <a:rPr lang="en-US" sz="2400" spc="-1" dirty="0">
+              <a:rPr lang="en-US" sz="2000" spc="-1" dirty="0">
                 <a:solidFill>
                   <a:schemeClr val="bg2">
                     <a:lumMod val="75000"/>
@@ -4003,7 +4039,7 @@
               </a:tabLst>
             </a:pPr>
             <a:r>
-              <a:rPr lang="en-US" sz="2400" spc="-1" dirty="0">
+              <a:rPr lang="en-US" sz="2000" spc="-1" dirty="0">
                 <a:solidFill>
                   <a:schemeClr val="bg2">
                     <a:lumMod val="75000"/>
@@ -4014,7 +4050,7 @@
               <a:t>Document </a:t>
             </a:r>
             <a:r>
-              <a:rPr lang="en-US" sz="2400" b="0" strike="noStrike" spc="-1" dirty="0">
+              <a:rPr lang="en-US" sz="2000" b="0" strike="noStrike" spc="-1" dirty="0">
                 <a:solidFill>
                   <a:schemeClr val="bg2">
                     <a:lumMod val="75000"/>
@@ -4026,7 +4062,7 @@
               <a:t>shepherd review done by Toerless Eckert </a:t>
             </a:r>
             <a:r>
-              <a:rPr lang="en-US" sz="2400" b="0" strike="noStrike" spc="-1" dirty="0">
+              <a:rPr lang="en-US" sz="2000" b="0" strike="noStrike" spc="-1" dirty="0">
                 <a:solidFill>
                   <a:schemeClr val="bg2">
                     <a:lumMod val="75000"/>
@@ -4038,7 +4074,7 @@
               <a:t>✓</a:t>
             </a:r>
             <a:r>
-              <a:rPr lang="en-US" sz="2400" b="0" strike="noStrike" spc="-1" dirty="0">
+              <a:rPr lang="en-US" sz="2000" b="0" strike="noStrike" spc="-1" dirty="0">
                 <a:solidFill>
                   <a:schemeClr val="bg2">
                     <a:lumMod val="75000"/>
@@ -4049,7 +4085,7 @@
               </a:rPr>
               <a:t> </a:t>
             </a:r>
-            <a:endParaRPr lang="en-US" sz="2400" b="0" strike="noStrike" spc="-1" dirty="0">
+            <a:endParaRPr lang="en-US" sz="2000" b="0" strike="noStrike" spc="-1" dirty="0">
               <a:solidFill>
                 <a:schemeClr val="bg2">
                   <a:lumMod val="75000"/>
@@ -4073,7 +4109,7 @@
               </a:tabLst>
             </a:pPr>
             <a:r>
-              <a:rPr lang="en-US" sz="2400" b="0" strike="noStrike" spc="-1" dirty="0">
+              <a:rPr lang="en-US" sz="2000" b="0" strike="noStrike" spc="-1" dirty="0">
                 <a:solidFill>
                   <a:schemeClr val="bg2">
                     <a:lumMod val="75000"/>
@@ -4100,7 +4136,7 @@
               </a:tabLst>
             </a:pPr>
             <a:r>
-              <a:rPr lang="en-US" sz="2400" b="0" strike="noStrike" spc="-1" dirty="0">
+              <a:rPr lang="en-US" sz="2000" b="0" strike="noStrike" spc="-1" dirty="0">
                 <a:solidFill>
                   <a:schemeClr val="bg2">
                     <a:lumMod val="75000"/>
@@ -4112,7 +4148,7 @@
               <a:t>SECDIR early </a:t>
             </a:r>
             <a:r>
-              <a:rPr lang="en-US" sz="2400" spc="-1" dirty="0">
+              <a:rPr lang="en-US" sz="2000" spc="-1" dirty="0">
                 <a:solidFill>
                   <a:schemeClr val="bg2">
                     <a:lumMod val="75000"/>
@@ -4124,7 +4160,7 @@
               <a:t>review </a:t>
             </a:r>
             <a:r>
-              <a:rPr lang="en-US" sz="2400" b="0" strike="noStrike" spc="-1" dirty="0">
+              <a:rPr lang="en-US" sz="2000" b="0" strike="noStrike" spc="-1" dirty="0">
                 <a:solidFill>
                   <a:schemeClr val="bg2">
                     <a:lumMod val="75000"/>
@@ -4136,7 +4172,7 @@
               <a:t>✓</a:t>
             </a:r>
             <a:r>
-              <a:rPr lang="en-US" sz="2400" b="0" strike="noStrike" spc="-1" dirty="0">
+              <a:rPr lang="en-US" sz="2000" b="0" strike="noStrike" spc="-1" dirty="0">
                 <a:solidFill>
                   <a:schemeClr val="bg2">
                     <a:lumMod val="75000"/>
@@ -4147,7 +4183,7 @@
               </a:rPr>
               <a:t> </a:t>
             </a:r>
-            <a:endParaRPr lang="en-US" sz="2400" b="0" strike="noStrike" spc="-1" dirty="0">
+            <a:endParaRPr lang="en-US" sz="2000" b="0" strike="noStrike" spc="-1" dirty="0">
               <a:solidFill>
                 <a:schemeClr val="bg2">
                   <a:lumMod val="75000"/>
@@ -4174,37 +4210,27 @@
               </a:tabLst>
             </a:pPr>
             <a:r>
-              <a:rPr lang="en-US" sz="2400" b="0" strike="noStrike" spc="-1" dirty="0">
+              <a:rPr lang="en-US" sz="2000" b="0" strike="noStrike" spc="-1" dirty="0">
                 <a:solidFill>
                   <a:srgbClr val="000000"/>
                 </a:solidFill>
                 <a:latin typeface="Calibri"/>
                 <a:ea typeface="DejaVu Sans"/>
               </a:rPr>
-              <a:t>WGLC ended on </a:t>
-            </a:r>
-            <a:r>
-              <a:rPr lang="en-US" sz="2400" b="0" strike="noStrike" spc="-1">
+              <a:t>WGLC ended on April 3</a:t>
+            </a:r>
+            <a:r>
+              <a:rPr lang="en-US" sz="2000" b="0" strike="noStrike" spc="-1" baseline="30000" dirty="0">
                 <a:solidFill>
                   <a:srgbClr val="000000"/>
                 </a:solidFill>
                 <a:latin typeface="Calibri"/>
                 <a:ea typeface="DejaVu Sans"/>
               </a:rPr>
-              <a:t>April 3</a:t>
-            </a:r>
-            <a:r>
-              <a:rPr lang="en-US" sz="2400" b="0" strike="noStrike" spc="-1" baseline="30000">
-                <a:solidFill>
-                  <a:srgbClr val="000000"/>
-                </a:solidFill>
-                <a:latin typeface="Calibri"/>
-                <a:ea typeface="DejaVu Sans"/>
-              </a:rPr>
               <a:t>rd </a:t>
             </a:r>
             <a:r>
-              <a:rPr lang="en-US" sz="2400" b="0" strike="noStrike" spc="-1">
+              <a:rPr lang="en-US" sz="2000" b="0" strike="noStrike" spc="-1" dirty="0">
                 <a:solidFill>
                   <a:srgbClr val="000000"/>
                 </a:solidFill>
@@ -4213,7 +4239,7 @@
               </a:rPr>
               <a:t>✓</a:t>
             </a:r>
-            <a:endParaRPr lang="en-US" sz="2400" b="0" strike="noStrike" spc="-1" baseline="30000" dirty="0">
+            <a:endParaRPr lang="en-US" sz="2000" b="0" strike="noStrike" spc="-1" baseline="30000" dirty="0">
               <a:solidFill>
                 <a:srgbClr val="000000"/>
               </a:solidFill>
@@ -4236,7 +4262,7 @@
               </a:tabLst>
             </a:pPr>
             <a:r>
-              <a:rPr lang="en-US" sz="2400" b="0" strike="noStrike" spc="-1" dirty="0">
+              <a:rPr lang="en-US" sz="2000" b="0" strike="noStrike" spc="-1" dirty="0">
                 <a:solidFill>
                   <a:srgbClr val="000000"/>
                 </a:solidFill>
@@ -4246,7 +4272,7 @@
               <a:t>document </a:t>
             </a:r>
             <a:r>
-              <a:rPr lang="en-US" sz="2400" spc="-1" dirty="0">
+              <a:rPr lang="en-US" sz="2000" spc="-1" dirty="0">
                 <a:solidFill>
                   <a:srgbClr val="000000"/>
                 </a:solidFill>
@@ -4255,7 +4281,7 @@
               <a:t>shepherd writeup </a:t>
             </a:r>
             <a:r>
-              <a:rPr lang="en-US" sz="2400" b="0" strike="noStrike" spc="-1" dirty="0">
+              <a:rPr lang="en-US" sz="2000" b="0" strike="noStrike" spc="-1" dirty="0">
                 <a:solidFill>
                   <a:srgbClr val="000000"/>
                 </a:solidFill>
@@ -4280,7 +4306,104 @@
               </a:tabLst>
             </a:pPr>
             <a:r>
-              <a:rPr lang="en-US" sz="2400" spc="-1" dirty="0">
+              <a:rPr lang="en-GB" sz="2000" spc="-1" dirty="0">
+                <a:solidFill>
+                  <a:srgbClr val="000000"/>
+                </a:solidFill>
+                <a:latin typeface="Calibri"/>
+                <a:cs typeface="Calibri"/>
+              </a:rPr>
+              <a:t>Yangdoctors review</a:t>
+            </a:r>
+            <a:r>
+              <a:rPr lang="en-US" sz="2000" spc="-1" dirty="0">
+                <a:solidFill>
+                  <a:srgbClr val="000000"/>
+                </a:solidFill>
+                <a:latin typeface="OpenSymbol"/>
+                <a:cs typeface="Calibri"/>
+              </a:rPr>
+              <a:t>: ready </a:t>
+            </a:r>
+            <a:r>
+              <a:rPr lang="en-US" sz="2000" b="0" strike="noStrike" spc="-1" dirty="0">
+                <a:solidFill>
+                  <a:srgbClr val="000000"/>
+                </a:solidFill>
+                <a:latin typeface="OpenSymbol"/>
+                <a:ea typeface="OpenSymbol"/>
+              </a:rPr>
+              <a:t>✓</a:t>
+            </a:r>
+          </a:p>
+          <a:p>
+            <a:pPr marL="228600" indent="-225360">
+              <a:spcBef>
+                <a:spcPts val="601"/>
+              </a:spcBef>
+              <a:buClr>
+                <a:srgbClr val="000000"/>
+              </a:buClr>
+              <a:buFont typeface="Arial"/>
+              <a:buChar char="•"/>
+              <a:tabLst>
+                <a:tab pos="408240" algn="l"/>
+              </a:tabLst>
+            </a:pPr>
+            <a:r>
+              <a:rPr lang="en-US" sz="2000" spc="-1" dirty="0">
+                <a:solidFill>
+                  <a:srgbClr val="000000"/>
+                </a:solidFill>
+                <a:latin typeface="OpenSymbol"/>
+                <a:ea typeface="OpenSymbol"/>
+              </a:rPr>
+              <a:t>SECDIR </a:t>
+            </a:r>
+            <a:r>
+              <a:rPr lang="en-GB" sz="2000" spc="-1" dirty="0">
+                <a:solidFill>
+                  <a:srgbClr val="000000"/>
+                </a:solidFill>
+                <a:latin typeface="Calibri"/>
+                <a:cs typeface="Calibri"/>
+              </a:rPr>
+              <a:t>Last Call </a:t>
+            </a:r>
+            <a:r>
+              <a:rPr lang="en-GB" sz="2000" spc="-1">
+                <a:solidFill>
+                  <a:srgbClr val="000000"/>
+                </a:solidFill>
+                <a:latin typeface="Calibri"/>
+                <a:cs typeface="Calibri"/>
+              </a:rPr>
+              <a:t>Review done?</a:t>
+            </a:r>
+            <a:endParaRPr lang="en-US" sz="2000" b="0" strike="noStrike" spc="-1" dirty="0">
+              <a:solidFill>
+                <a:srgbClr val="000000"/>
+              </a:solidFill>
+              <a:latin typeface="OpenSymbol"/>
+              <a:ea typeface="OpenSymbol"/>
+            </a:endParaRPr>
+          </a:p>
+          <a:p>
+            <a:pPr marL="228600" indent="-225360">
+              <a:spcBef>
+                <a:spcPts val="601"/>
+              </a:spcBef>
+              <a:buClr>
+                <a:srgbClr val="000000"/>
+              </a:buClr>
+              <a:buFont typeface="Arial"/>
+              <a:buChar char="•"/>
+              <a:tabLst>
+                <a:tab pos="408240" algn="l"/>
+              </a:tabLst>
+            </a:pPr>
+            <a:r>
+              <a:rPr lang="en-US" sz="2000" spc="-1" dirty="0">
                 <a:solidFill>
                   <a:srgbClr val="000000"/>
                 </a:solidFill>
@@ -4307,7 +4430,7 @@
               </a:tabLst>
             </a:pPr>
             <a:r>
-              <a:rPr lang="en-US" sz="2400" spc="-1" dirty="0">
+              <a:rPr lang="en-US" sz="2000" spc="-1" dirty="0">
                 <a:solidFill>
                   <a:srgbClr val="000000"/>
                 </a:solidFill>
@@ -8089,16 +8212,16 @@
               </a:lnSpc>
             </a:pPr>
             <a:r>
-              <a:rPr lang="en-US" sz="3600" b="0" strike="noStrike" spc="-1">
+              <a:rPr lang="en-US" sz="3600" b="0" strike="noStrike" spc="-1" dirty="0">
                 <a:solidFill>
                   <a:srgbClr val="000000"/>
                 </a:solidFill>
                 <a:latin typeface="Calibri Light"/>
                 <a:ea typeface="DejaVu Sans"/>
               </a:rPr>
-              <a:t>BRSKI-AE: abstract protocol overview</a:t>
-            </a:r>
-            <a:endParaRPr lang="en-US" sz="3600" b="0" strike="noStrike" spc="-1">
+              <a:t>Backup slide: BRSKI-AE abstract protocol overview</a:t>
+            </a:r>
+            <a:endParaRPr lang="en-US" sz="3600" b="0" strike="noStrike" spc="-1" dirty="0">
               <a:latin typeface="Arial"/>
             </a:endParaRPr>
           </a:p>
@@ -9330,28 +9453,6 @@
 </file>
 
 <file path=customXml/item1.xml><?xml version="1.0" encoding="utf-8"?>
-<p:properties xmlns:p="http://schemas.microsoft.com/office/2006/metadata/properties" xmlns:xsi="http://www.w3.org/2001/XMLSchema-instance" xmlns:pc="http://schemas.microsoft.com/office/infopath/2007/PartnerControls">
-  <documentManagement>
-    <_ip_UnifiedCompliancePolicyUIAction xmlns="http://schemas.microsoft.com/sharepoint/v3" xsi:nil="true"/>
-    <TaxCatchAll xmlns="56810815-8df0-4f10-8da7-34164765fbe3" xsi:nil="true"/>
-    <_ip_UnifiedCompliancePolicyProperties xmlns="http://schemas.microsoft.com/sharepoint/v3" xsi:nil="true"/>
-    <lcf76f155ced4ddcb4097134ff3c332f xmlns="a9de424c-86b2-47ed-8d4e-0a9b7010e669">
-      <Terms xmlns="http://schemas.microsoft.com/office/infopath/2007/PartnerControls"/>
-    </lcf76f155ced4ddcb4097134ff3c332f>
-  </documentManagement>
-</p:properties>
-</file>
-
-<file path=customXml/item2.xml><?xml version="1.0" encoding="utf-8"?>
-<?mso-contentType ?>
-<FormTemplates xmlns="http://schemas.microsoft.com/sharepoint/v3/contenttype/forms">
-  <Display>DocumentLibraryForm</Display>
-  <Edit>DocumentLibraryForm</Edit>
-  <New>DocumentLibraryForm</New>
-</FormTemplates>
-</file>
-
-<file path=customXml/item3.xml><?xml version="1.0" encoding="utf-8"?>
 <ct:contentTypeSchema xmlns:ct="http://schemas.microsoft.com/office/2006/metadata/contentType" xmlns:ma="http://schemas.microsoft.com/office/2006/metadata/properties/metaAttributes" ct:_="" ma:_="" ma:contentTypeName="Document" ma:contentTypeID="0x01010035CD6C532085F8449DFAA9E5E2A73509" ma:contentTypeVersion="20" ma:contentTypeDescription="Create a new document." ma:contentTypeScope="" ma:versionID="c8bdef1fc4896ae71e847eb90f6c3082">
   <xsd:schema xmlns:xsd="http://www.w3.org/2001/XMLSchema" xmlns:xs="http://www.w3.org/2001/XMLSchema" xmlns:p="http://schemas.microsoft.com/office/2006/metadata/properties" xmlns:ns1="http://schemas.microsoft.com/sharepoint/v3" xmlns:ns2="ce079751-a51b-4a27-9376-edf93eae18d5" xmlns:ns3="a9de424c-86b2-47ed-8d4e-0a9b7010e669" xmlns:ns4="56810815-8df0-4f10-8da7-34164765fbe3" targetNamespace="http://schemas.microsoft.com/office/2006/metadata/properties" ma:root="true" ma:fieldsID="3fdf977c7d89e1bf9cca898b31dbd6fd" ns1:_="" ns2:_="" ns3:_="" ns4:_="">
     <xsd:import namespace="http://schemas.microsoft.com/sharepoint/v3"/>
@@ -9616,34 +9717,29 @@
 </ct:contentTypeSchema>
 </file>
 
-<file path=customXml/itemProps1.xml><?xml version="1.0" encoding="utf-8"?>
-<ds:datastoreItem xmlns:ds="http://schemas.openxmlformats.org/officeDocument/2006/customXml" ds:itemID="{C176CB81-6753-41D9-B160-D542CFFB89BA}">
-  <ds:schemaRefs>
-    <ds:schemaRef ds:uri="a9de424c-86b2-47ed-8d4e-0a9b7010e669"/>
-    <ds:schemaRef ds:uri="ce079751-a51b-4a27-9376-edf93eae18d5"/>
-    <ds:schemaRef ds:uri="http://purl.org/dc/terms/"/>
-    <ds:schemaRef ds:uri="http://schemas.microsoft.com/office/2006/documentManagement/types"/>
-    <ds:schemaRef ds:uri="http://schemas.microsoft.com/office/infopath/2007/PartnerControls"/>
-    <ds:schemaRef ds:uri="http://schemas.openxmlformats.org/package/2006/metadata/core-properties"/>
-    <ds:schemaRef ds:uri="http://purl.org/dc/elements/1.1/"/>
-    <ds:schemaRef ds:uri="http://schemas.microsoft.com/office/2006/metadata/properties"/>
-    <ds:schemaRef ds:uri="http://schemas.microsoft.com/sharepoint/v3"/>
-    <ds:schemaRef ds:uri="56810815-8df0-4f10-8da7-34164765fbe3"/>
-    <ds:schemaRef ds:uri="http://www.w3.org/XML/1998/namespace"/>
-    <ds:schemaRef ds:uri="http://purl.org/dc/dcmitype/"/>
-  </ds:schemaRefs>
-</ds:datastoreItem>
+<file path=customXml/item2.xml><?xml version="1.0" encoding="utf-8"?>
+<?mso-contentType ?>
+<FormTemplates xmlns="http://schemas.microsoft.com/sharepoint/v3/contenttype/forms">
+  <Display>DocumentLibraryForm</Display>
+  <Edit>DocumentLibraryForm</Edit>
+  <New>DocumentLibraryForm</New>
+</FormTemplates>
 </file>
 
-<file path=customXml/itemProps2.xml><?xml version="1.0" encoding="utf-8"?>
-<ds:datastoreItem xmlns:ds="http://schemas.openxmlformats.org/officeDocument/2006/customXml" ds:itemID="{5C6BD9E7-C020-4AD1-A7ED-9C09B3AA4FEA}">
-  <ds:schemaRefs>
-    <ds:schemaRef ds:uri="http://schemas.microsoft.com/sharepoint/v3/contenttype/forms"/>
-  </ds:schemaRefs>
-</ds:datastoreItem>
+<file path=customXml/item3.xml><?xml version="1.0" encoding="utf-8"?>
+<p:properties xmlns:p="http://schemas.microsoft.com/office/2006/metadata/properties" xmlns:xsi="http://www.w3.org/2001/XMLSchema-instance" xmlns:pc="http://schemas.microsoft.com/office/infopath/2007/PartnerControls">
+  <documentManagement>
+    <_ip_UnifiedCompliancePolicyUIAction xmlns="http://schemas.microsoft.com/sharepoint/v3" xsi:nil="true"/>
+    <TaxCatchAll xmlns="56810815-8df0-4f10-8da7-34164765fbe3" xsi:nil="true"/>
+    <_ip_UnifiedCompliancePolicyProperties xmlns="http://schemas.microsoft.com/sharepoint/v3" xsi:nil="true"/>
+    <lcf76f155ced4ddcb4097134ff3c332f xmlns="a9de424c-86b2-47ed-8d4e-0a9b7010e669">
+      <Terms xmlns="http://schemas.microsoft.com/office/infopath/2007/PartnerControls"/>
+    </lcf76f155ced4ddcb4097134ff3c332f>
+  </documentManagement>
+</p:properties>
 </file>
 
-<file path=customXml/itemProps3.xml><?xml version="1.0" encoding="utf-8"?>
+<file path=customXml/itemProps1.xml><?xml version="1.0" encoding="utf-8"?>
 <ds:datastoreItem xmlns:ds="http://schemas.openxmlformats.org/officeDocument/2006/customXml" ds:itemID="{E037FCD1-B3DE-4EDE-B6BD-6CF808058DC1}">
   <ds:schemaRefs>
     <ds:schemaRef ds:uri="56810815-8df0-4f10-8da7-34164765fbe3"/>
@@ -9662,4 +9758,31 @@
     <ds:schemaRef ds:uri="http://www.w3.org/2001/XMLSchema"/>
   </ds:schemaRefs>
 </ds:datastoreItem>
+</file>
+
+<file path=customXml/itemProps2.xml><?xml version="1.0" encoding="utf-8"?>
+<ds:datastoreItem xmlns:ds="http://schemas.openxmlformats.org/officeDocument/2006/customXml" ds:itemID="{5C6BD9E7-C020-4AD1-A7ED-9C09B3AA4FEA}">
+  <ds:schemaRefs>
+    <ds:schemaRef ds:uri="http://schemas.microsoft.com/sharepoint/v3/contenttype/forms"/>
+  </ds:schemaRefs>
+</ds:datastoreItem>
+</file>
+
+<file path=customXml/itemProps3.xml><?xml version="1.0" encoding="utf-8"?>
+<ds:datastoreItem xmlns:ds="http://schemas.openxmlformats.org/officeDocument/2006/customXml" ds:itemID="{C176CB81-6753-41D9-B160-D542CFFB89BA}">
+  <ds:schemaRefs>
+    <ds:schemaRef ds:uri="a9de424c-86b2-47ed-8d4e-0a9b7010e669"/>
+    <ds:schemaRef ds:uri="ce079751-a51b-4a27-9376-edf93eae18d5"/>
+    <ds:schemaRef ds:uri="http://purl.org/dc/terms/"/>
+    <ds:schemaRef ds:uri="http://schemas.microsoft.com/office/2006/documentManagement/types"/>
+    <ds:schemaRef ds:uri="http://schemas.microsoft.com/office/infopath/2007/PartnerControls"/>
+    <ds:schemaRef ds:uri="http://schemas.openxmlformats.org/package/2006/metadata/core-properties"/>
+    <ds:schemaRef ds:uri="http://purl.org/dc/elements/1.1/"/>
+    <ds:schemaRef ds:uri="http://schemas.microsoft.com/office/2006/metadata/properties"/>
+    <ds:schemaRef ds:uri="http://schemas.microsoft.com/sharepoint/v3"/>
+    <ds:schemaRef ds:uri="56810815-8df0-4f10-8da7-34164765fbe3"/>
+    <ds:schemaRef ds:uri="http://www.w3.org/XML/1998/namespace"/>
+    <ds:schemaRef ds:uri="http://purl.org/dc/dcmitype/"/>
+  </ds:schemaRefs>
+</ds:datastoreItem>
 </file>
</xml_diff>

<commit_message>
slides-118-BRSKI-AE.pptx: update after design team discussion on 2023-11-06 at IETF 118
</commit_message>
<xml_diff>
--- a/presentations/slides-118-BRSKI-AE.pptx
+++ b/presentations/slides-118-BRSKI-AE.pptx
@@ -3517,8 +3517,8 @@
         </p:nvSpPr>
         <p:spPr>
           <a:xfrm>
-            <a:off x="649983" y="1532021"/>
-            <a:ext cx="11214538" cy="4876800"/>
+            <a:off x="536028" y="1532021"/>
+            <a:ext cx="11328493" cy="4876800"/>
           </a:xfrm>
           <a:prstGeom prst="rect">
             <a:avLst/>
@@ -3550,11 +3550,14 @@
               <a:lnSpc>
                 <a:spcPct val="100000"/>
               </a:lnSpc>
+              <a:spcAft>
+                <a:spcPts val="200"/>
+              </a:spcAft>
               <a:buFont typeface="Arial" panose="020B0604020202020204" pitchFamily="34" charset="0"/>
               <a:buChar char="•"/>
             </a:pPr>
             <a:r>
-              <a:rPr lang="en-US" sz="2000" b="0" strike="noStrike" spc="-1" dirty="0">
+              <a:rPr lang="en-US" sz="2200" b="0" strike="noStrike" spc="-1" dirty="0">
                 <a:solidFill>
                   <a:srgbClr val="000000"/>
                 </a:solidFill>
@@ -3562,10 +3565,10 @@
                 <a:ea typeface="DejaVu Sans"/>
                 <a:cs typeface="Calibri"/>
               </a:rPr>
-              <a:t>WGLC ended April 3</a:t>
-            </a:r>
-            <a:r>
-              <a:rPr lang="en-US" sz="2000" b="0" strike="noStrike" spc="-1" baseline="30000" dirty="0">
+              <a:t>WGLC </a:t>
+            </a:r>
+            <a:r>
+              <a:rPr lang="en-US" sz="2200" b="1" strike="noStrike" spc="-1" dirty="0">
                 <a:solidFill>
                   <a:srgbClr val="000000"/>
                 </a:solidFill>
@@ -3573,10 +3576,32 @@
                 <a:ea typeface="DejaVu Sans"/>
                 <a:cs typeface="Calibri"/>
               </a:rPr>
+              <a:t>ended</a:t>
+            </a:r>
+            <a:r>
+              <a:rPr lang="en-US" sz="2200" b="0" strike="noStrike" spc="-1" dirty="0">
+                <a:solidFill>
+                  <a:srgbClr val="000000"/>
+                </a:solidFill>
+                <a:latin typeface="Calibri"/>
+                <a:ea typeface="DejaVu Sans"/>
+                <a:cs typeface="Calibri"/>
+              </a:rPr>
+              <a:t> April 3</a:t>
+            </a:r>
+            <a:r>
+              <a:rPr lang="en-US" sz="2200" b="0" strike="noStrike" spc="-1" baseline="30000" dirty="0">
+                <a:solidFill>
+                  <a:srgbClr val="000000"/>
+                </a:solidFill>
+                <a:latin typeface="Calibri"/>
+                <a:ea typeface="DejaVu Sans"/>
+                <a:cs typeface="Calibri"/>
+              </a:rPr>
               <a:t>rd</a:t>
             </a:r>
             <a:r>
-              <a:rPr lang="en-GB" sz="2000" spc="-1" dirty="0">
+              <a:rPr lang="en-GB" sz="2200" spc="-1" dirty="0">
                 <a:solidFill>
                   <a:srgbClr val="000000"/>
                 </a:solidFill>
@@ -3591,11 +3616,14 @@
               <a:lnSpc>
                 <a:spcPct val="100000"/>
               </a:lnSpc>
+              <a:spcAft>
+                <a:spcPts val="200"/>
+              </a:spcAft>
               <a:buFont typeface="Arial" panose="020B0604020202020204" pitchFamily="34" charset="0"/>
               <a:buChar char="•"/>
             </a:pPr>
             <a:r>
-              <a:rPr lang="en-GB" sz="2000" spc="-1" dirty="0">
+              <a:rPr lang="en-GB" sz="2200" spc="-1" dirty="0">
                 <a:solidFill>
                   <a:srgbClr val="000000"/>
                 </a:solidFill>
@@ -3605,7 +3633,7 @@
               <a:t>Yangdoctors review updated on Aug 31</a:t>
             </a:r>
             <a:r>
-              <a:rPr lang="en-GB" sz="2000" spc="-1" baseline="30000" dirty="0">
+              <a:rPr lang="en-GB" sz="2200" spc="-1" baseline="30000" dirty="0">
                 <a:solidFill>
                   <a:srgbClr val="000000"/>
                 </a:solidFill>
@@ -3615,14 +3643,24 @@
               <a:t>st</a:t>
             </a:r>
             <a:r>
-              <a:rPr lang="en-GB" sz="2000" spc="-1" dirty="0">
+              <a:rPr lang="en-GB" sz="2200" spc="-1" dirty="0">
                 <a:solidFill>
                   <a:srgbClr val="000000"/>
                 </a:solidFill>
                 <a:latin typeface="Calibri"/>
                 <a:cs typeface="Calibri"/>
               </a:rPr>
-              <a:t>; result: Ready</a:t>
+              <a:t>; result: </a:t>
+            </a:r>
+            <a:r>
+              <a:rPr lang="en-GB" sz="2200" b="1" spc="-1" dirty="0">
+                <a:solidFill>
+                  <a:srgbClr val="000000"/>
+                </a:solidFill>
+                <a:latin typeface="Calibri"/>
+                <a:cs typeface="Calibri"/>
+              </a:rPr>
+              <a:t>Ready</a:t>
             </a:r>
           </a:p>
           <a:p>
@@ -3630,21 +3668,24 @@
               <a:lnSpc>
                 <a:spcPct val="100000"/>
               </a:lnSpc>
+              <a:spcAft>
+                <a:spcPts val="200"/>
+              </a:spcAft>
               <a:buFont typeface="Arial" panose="020B0604020202020204" pitchFamily="34" charset="0"/>
               <a:buChar char="•"/>
             </a:pPr>
             <a:r>
-              <a:rPr lang="en-GB" sz="2000" spc="-1" dirty="0">
+              <a:rPr lang="en-GB" sz="2200" spc="-1" dirty="0">
                 <a:solidFill>
                   <a:srgbClr val="000000"/>
                 </a:solidFill>
                 <a:latin typeface="Calibri"/>
                 <a:cs typeface="Calibri"/>
               </a:rPr>
-              <a:t>SECDIR Last Call Review requested on Aug 7</a:t>
-            </a:r>
-            <a:r>
-              <a:rPr lang="en-GB" sz="2000" spc="-1" baseline="30000" dirty="0">
+              <a:t>SECDIR Last Call Review completed on Nov 4</a:t>
+            </a:r>
+            <a:r>
+              <a:rPr lang="en-GB" sz="2200" spc="-1" baseline="30000" dirty="0">
                 <a:solidFill>
                   <a:srgbClr val="000000"/>
                 </a:solidFill>
@@ -3654,14 +3695,24 @@
               <a:t>th</a:t>
             </a:r>
             <a:r>
-              <a:rPr lang="en-GB" sz="2000" spc="-1" dirty="0">
+              <a:rPr lang="en-GB" sz="2200" spc="-1" dirty="0">
                 <a:solidFill>
                   <a:srgbClr val="000000"/>
                 </a:solidFill>
                 <a:latin typeface="Calibri"/>
                 <a:cs typeface="Calibri"/>
               </a:rPr>
-              <a:t>; status: review not complete yet</a:t>
+              <a:t>; status: </a:t>
+            </a:r>
+            <a:r>
+              <a:rPr lang="en-GB" sz="2200" b="1" spc="-1" dirty="0">
+                <a:solidFill>
+                  <a:srgbClr val="000000"/>
+                </a:solidFill>
+                <a:latin typeface="Calibri"/>
+                <a:cs typeface="Calibri"/>
+              </a:rPr>
+              <a:t>Ready</a:t>
             </a:r>
           </a:p>
           <a:p>
@@ -3669,65 +3720,157 @@
               <a:lnSpc>
                 <a:spcPct val="100000"/>
               </a:lnSpc>
+              <a:spcAft>
+                <a:spcPts val="200"/>
+              </a:spcAft>
               <a:buFont typeface="Arial" panose="020B0604020202020204" pitchFamily="34" charset="0"/>
               <a:buChar char="•"/>
             </a:pPr>
             <a:r>
-              <a:rPr lang="en-US" sz="2000" spc="-1" dirty="0">
+              <a:rPr lang="en-US" sz="2200" spc="-1" dirty="0">
                 <a:solidFill>
                   <a:srgbClr val="000000"/>
                 </a:solidFill>
                 <a:latin typeface="Calibri"/>
                 <a:cs typeface="Calibri"/>
               </a:rPr>
-              <a:t>Only one open issue: </a:t>
+              <a:t>Only </a:t>
+            </a:r>
+            <a:r>
+              <a:rPr lang="en-US" sz="2200" b="1" spc="-1" dirty="0">
+                <a:solidFill>
+                  <a:srgbClr val="000000"/>
+                </a:solidFill>
+                <a:latin typeface="Calibri"/>
+                <a:cs typeface="Calibri"/>
+              </a:rPr>
+              <a:t>one issue remaining to be closed</a:t>
+            </a:r>
+            <a:r>
+              <a:rPr lang="en-US" sz="2200" spc="-1" dirty="0">
+                <a:solidFill>
+                  <a:srgbClr val="000000"/>
+                </a:solidFill>
+                <a:latin typeface="Calibri"/>
+                <a:cs typeface="Calibri"/>
+              </a:rPr>
+              <a:t>: </a:t>
+            </a:r>
+          </a:p>
+          <a:p>
+            <a:pPr lvl="1">
+              <a:spcAft>
+                <a:spcPts val="200"/>
+              </a:spcAft>
+            </a:pPr>
+            <a:r>
+              <a:rPr lang="en-US" sz="2200" spc="-1" dirty="0">
+                <a:solidFill>
+                  <a:srgbClr val="000000"/>
+                </a:solidFill>
+                <a:latin typeface="Calibri"/>
+                <a:cs typeface="Calibri"/>
+              </a:rPr>
+              <a:t>[RFC 8995] not supporting discovering of registrars with enhanced feature sets, as in BRSKI-AE</a:t>
+            </a:r>
+          </a:p>
+          <a:p>
+            <a:pPr>
+              <a:spcAft>
+                <a:spcPts val="200"/>
+              </a:spcAft>
+            </a:pPr>
+            <a:r>
+              <a:rPr lang="en-US" sz="2200" spc="-1" dirty="0">
+                <a:solidFill>
+                  <a:srgbClr val="000000"/>
+                </a:solidFill>
+                <a:latin typeface="Calibri"/>
+                <a:cs typeface="Calibri"/>
+              </a:rPr>
+              <a:t>     </a:t>
+            </a:r>
+            <a:r>
+              <a:rPr lang="en-US" sz="2200" b="1" spc="-1" dirty="0">
+                <a:solidFill>
+                  <a:srgbClr val="000000"/>
+                </a:solidFill>
+                <a:latin typeface="Calibri"/>
+                <a:cs typeface="Calibri"/>
+              </a:rPr>
+              <a:t>Alignment reached </a:t>
+            </a:r>
+            <a:r>
+              <a:rPr lang="en-US" sz="2200" spc="-1" dirty="0">
+                <a:solidFill>
+                  <a:srgbClr val="000000"/>
+                </a:solidFill>
+                <a:latin typeface="Calibri"/>
+                <a:cs typeface="Calibri"/>
+              </a:rPr>
+              <a:t>in design team:</a:t>
             </a:r>
           </a:p>
           <a:p>
             <a:pPr marL="800100" lvl="1" indent="-342900">
+              <a:spcAft>
+                <a:spcPts val="200"/>
+              </a:spcAft>
               <a:buFont typeface="Arial" panose="020B0604020202020204" pitchFamily="34" charset="0"/>
               <a:buChar char="•"/>
             </a:pPr>
             <a:r>
-              <a:rPr lang="en-US" sz="2000" spc="-1" dirty="0">
+              <a:rPr lang="en-US" sz="2200" spc="-1" dirty="0">
                 <a:solidFill>
                   <a:srgbClr val="000000"/>
                 </a:solidFill>
                 <a:latin typeface="Calibri"/>
                 <a:cs typeface="Calibri"/>
               </a:rPr>
-              <a:t>How to describe discovery of registrars with BRSKI-AE capabilities</a:t>
-            </a:r>
-          </a:p>
-          <a:p>
-            <a:r>
-              <a:rPr lang="en-US" sz="2000" spc="-1" dirty="0">
+              <a:t>A general problem, to be solved in a general way, such as by new draft: [</a:t>
+            </a:r>
+            <a:r>
+              <a:rPr lang="en-US" sz="2200" spc="-1" dirty="0">
                 <a:solidFill>
                   <a:srgbClr val="000000"/>
                 </a:solidFill>
                 <a:latin typeface="Calibri"/>
                 <a:cs typeface="Calibri"/>
-              </a:rPr>
-              <a:t>     Proposed approach (discussed in Design Team):</a:t>
+                <a:hlinkClick r:id="rId3"/>
+              </a:rPr>
+              <a:t>BRSKI-Discovery</a:t>
+            </a:r>
+            <a:r>
+              <a:rPr lang="en-US" sz="2200" spc="-1" dirty="0">
+                <a:solidFill>
+                  <a:srgbClr val="000000"/>
+                </a:solidFill>
+                <a:latin typeface="Calibri"/>
+                <a:cs typeface="Calibri"/>
+              </a:rPr>
+              <a:t>]</a:t>
             </a:r>
           </a:p>
           <a:p>
             <a:pPr marL="800100" lvl="1" indent="-342900">
+              <a:spcAft>
+                <a:spcPts val="200"/>
+              </a:spcAft>
               <a:buFont typeface="Arial" panose="020B0604020202020204" pitchFamily="34" charset="0"/>
               <a:buChar char="•"/>
             </a:pPr>
             <a:r>
-              <a:rPr lang="en-US" sz="2000" spc="-1" dirty="0">
+              <a:rPr lang="en-US" sz="2200" spc="-1" dirty="0">
                 <a:solidFill>
                   <a:srgbClr val="000000"/>
                 </a:solidFill>
                 <a:latin typeface="Calibri"/>
                 <a:cs typeface="Calibri"/>
               </a:rPr>
-              <a:t>In engineered environments, use discovery as specified in RFC 8995,</a:t>
+              <a:t>How to handle the absence of such a solution?</a:t>
             </a:r>
             <a:br>
-              <a:rPr lang="en-US" sz="2000" spc="-1" dirty="0">
+              <a:rPr lang="en-US" sz="2200" spc="-1" dirty="0">
                 <a:solidFill>
                   <a:srgbClr val="000000"/>
                 </a:solidFill>
@@ -3736,141 +3879,135 @@
               </a:rPr>
             </a:br>
             <a:r>
-              <a:rPr lang="en-US" sz="2000" spc="-1" dirty="0">
+              <a:rPr lang="en-US" sz="2200" spc="-1" dirty="0">
                 <a:solidFill>
                   <a:srgbClr val="000000"/>
                 </a:solidFill>
                 <a:latin typeface="Calibri"/>
                 <a:cs typeface="Calibri"/>
               </a:rPr>
-              <a:t>assuming a-priori knowledge of functionality and supported enrollment protocol. </a:t>
-            </a:r>
-          </a:p>
-          <a:p>
-            <a:pPr marL="800100" lvl="1" indent="-342900">
+              <a:t>Simple approach chosen for CMP: use specific service name, e.g., ”</a:t>
+            </a:r>
+            <a:r>
+              <a:rPr lang="en-US" sz="2200" spc="-1" dirty="0" err="1">
+                <a:solidFill>
+                  <a:srgbClr val="000000"/>
+                </a:solidFill>
+                <a:latin typeface="Calibri"/>
+                <a:cs typeface="Calibri"/>
+              </a:rPr>
+              <a:t>brski</a:t>
+            </a:r>
+            <a:r>
+              <a:rPr lang="en-US" sz="2200" spc="-1" dirty="0">
+                <a:solidFill>
+                  <a:srgbClr val="000000"/>
+                </a:solidFill>
+                <a:latin typeface="Calibri"/>
+                <a:cs typeface="Calibri"/>
+              </a:rPr>
+              <a:t>-registrar-</a:t>
+            </a:r>
+            <a:r>
+              <a:rPr lang="en-US" sz="2200" spc="-1" dirty="0" err="1">
+                <a:solidFill>
+                  <a:srgbClr val="000000"/>
+                </a:solidFill>
+                <a:latin typeface="Calibri"/>
+                <a:cs typeface="Calibri"/>
+              </a:rPr>
+              <a:t>cmp</a:t>
+            </a:r>
+            <a:r>
+              <a:rPr lang="en-US" sz="2200" spc="-1" dirty="0">
+                <a:solidFill>
+                  <a:srgbClr val="000000"/>
+                </a:solidFill>
+                <a:latin typeface="Calibri"/>
+                <a:cs typeface="Calibri"/>
+              </a:rPr>
+              <a:t>”</a:t>
+            </a:r>
+          </a:p>
+          <a:p>
+            <a:pPr marL="342900" indent="-342900">
+              <a:spcAft>
+                <a:spcPts val="200"/>
+              </a:spcAft>
               <a:buFont typeface="Arial" panose="020B0604020202020204" pitchFamily="34" charset="0"/>
               <a:buChar char="•"/>
             </a:pPr>
             <a:r>
-              <a:rPr lang="en-US" sz="2000" spc="-1" dirty="0">
+              <a:rPr lang="en-US" sz="2200" b="1" strike="noStrike" spc="-1" dirty="0">
                 <a:solidFill>
                   <a:srgbClr val="000000"/>
                 </a:solidFill>
                 <a:latin typeface="Calibri"/>
+                <a:ea typeface="DejaVu Sans"/>
                 <a:cs typeface="Calibri"/>
               </a:rPr>
-              <a:t>For heterogeneous scenarios, a more general solution is being defined: </a:t>
-            </a:r>
-            <a:r>
-              <a:rPr lang="en-US" sz="2000" spc="-1" dirty="0">
+              <a:t>Changelog</a:t>
+            </a:r>
+            <a:r>
+              <a:rPr lang="en-US" sz="2200" b="0" strike="noStrike" spc="-1" dirty="0">
                 <a:solidFill>
                   <a:srgbClr val="000000"/>
                 </a:solidFill>
                 <a:latin typeface="Calibri"/>
+                <a:ea typeface="DejaVu Sans"/>
                 <a:cs typeface="Calibri"/>
-                <a:hlinkClick r:id="rId3"/>
-              </a:rPr>
-              <a:t>BRSKI-Discovery</a:t>
-            </a:r>
-            <a:endParaRPr lang="en-US" sz="2000" spc="-1" dirty="0">
-              <a:solidFill>
-                <a:srgbClr val="000000"/>
-              </a:solidFill>
-              <a:latin typeface="Calibri"/>
-              <a:cs typeface="Calibri"/>
-            </a:endParaRPr>
+              </a:rPr>
+              <a:t> from version 05 to 06: 	</a:t>
+            </a:r>
           </a:p>
           <a:p>
             <a:pPr marL="800100" lvl="1" indent="-342900">
+              <a:spcAft>
+                <a:spcPts val="200"/>
+              </a:spcAft>
               <a:buFont typeface="Arial" panose="020B0604020202020204" pitchFamily="34" charset="0"/>
               <a:buChar char="•"/>
             </a:pPr>
             <a:r>
-              <a:rPr lang="en-US" sz="2000" spc="-1" dirty="0">
+              <a:rPr lang="en-US" sz="2200" spc="-1" dirty="0">
                 <a:solidFill>
                   <a:srgbClr val="000000"/>
                 </a:solidFill>
                 <a:latin typeface="Calibri"/>
                 <a:cs typeface="Calibri"/>
               </a:rPr>
-              <a:t>This avoids extra requirements and implementation effort regarding discovery in simple cases</a:t>
-            </a:r>
-            <a:br>
-              <a:rPr lang="en-US" sz="2000" spc="-1" dirty="0">
-                <a:solidFill>
-                  <a:srgbClr val="000000"/>
-                </a:solidFill>
-                <a:latin typeface="Calibri"/>
-                <a:cs typeface="Calibri"/>
-              </a:rPr>
-            </a:br>
-            <a:r>
-              <a:rPr lang="en-US" sz="2000" spc="-1" dirty="0">
-                <a:solidFill>
-                  <a:srgbClr val="000000"/>
-                </a:solidFill>
-                <a:latin typeface="Calibri"/>
-                <a:cs typeface="Calibri"/>
-              </a:rPr>
-              <a:t>and allows finalization of BRSKI-AE and further BRSKI enhancements, while referencing a more versatile approach.</a:t>
-            </a:r>
-          </a:p>
-          <a:p>
-            <a:pPr marL="342900" indent="-342900">
+              <a:t>Extend section on discovery according to discussion in the BRSKI design team</a:t>
+            </a:r>
+          </a:p>
+          <a:p>
+            <a:pPr marL="800100" lvl="1" indent="-342900">
+              <a:spcAft>
+                <a:spcPts val="200"/>
+              </a:spcAft>
               <a:buFont typeface="Arial" panose="020B0604020202020204" pitchFamily="34" charset="0"/>
               <a:buChar char="•"/>
             </a:pPr>
             <a:r>
-              <a:rPr lang="en-US" sz="2000" b="0" strike="noStrike" spc="-1" dirty="0">
+              <a:rPr lang="en-US" sz="2200" spc="-1" dirty="0">
                 <a:solidFill>
                   <a:srgbClr val="000000"/>
                 </a:solidFill>
                 <a:latin typeface="Calibri"/>
-                <a:ea typeface="DejaVu Sans"/>
                 <a:cs typeface="Calibri"/>
               </a:rPr>
-              <a:t>Changelog from version 05 to 06: 	</a:t>
+              <a:t>Make explicit that MASA voucher status telemetry is as in BRSKI</a:t>
             </a:r>
           </a:p>
           <a:p>
             <a:pPr marL="800100" lvl="1" indent="-342900">
+              <a:spcAft>
+                <a:spcPts val="200"/>
+              </a:spcAft>
               <a:buFont typeface="Arial" panose="020B0604020202020204" pitchFamily="34" charset="0"/>
               <a:buChar char="•"/>
             </a:pPr>
             <a:r>
-              <a:rPr lang="en-US" sz="2000" spc="-1" dirty="0">
-                <a:solidFill>
-                  <a:srgbClr val="000000"/>
-                </a:solidFill>
-                <a:latin typeface="Calibri"/>
-                <a:cs typeface="Calibri"/>
-              </a:rPr>
-              <a:t>Extend section on discovery according to discussion in the BRSKI design team</a:t>
-            </a:r>
-          </a:p>
-          <a:p>
-            <a:pPr marL="800100" lvl="1" indent="-342900">
-              <a:buFont typeface="Arial" panose="020B0604020202020204" pitchFamily="34" charset="0"/>
-              <a:buChar char="•"/>
-            </a:pPr>
-            <a:r>
-              <a:rPr lang="en-US" sz="2000" spc="-1" dirty="0">
-                <a:solidFill>
-                  <a:srgbClr val="000000"/>
-                </a:solidFill>
-                <a:latin typeface="Calibri"/>
-                <a:cs typeface="Calibri"/>
-              </a:rPr>
-              <a:t>Make explicit that MASA voucher status telemetry is as in BRSKI</a:t>
-            </a:r>
-          </a:p>
-          <a:p>
-            <a:pPr marL="800100" lvl="1" indent="-342900">
-              <a:buFont typeface="Arial" panose="020B0604020202020204" pitchFamily="34" charset="0"/>
-              <a:buChar char="•"/>
-            </a:pPr>
-            <a:r>
-              <a:rPr lang="en-US" sz="2000" spc="-1" dirty="0">
+              <a:rPr lang="en-US" sz="2200" spc="-1" dirty="0">
                 <a:solidFill>
                   <a:srgbClr val="000000"/>
                 </a:solidFill>
@@ -4368,25 +4505,18 @@
                 <a:latin typeface="Calibri"/>
                 <a:cs typeface="Calibri"/>
               </a:rPr>
-              <a:t>Last Call </a:t>
-            </a:r>
-            <a:r>
-              <a:rPr lang="en-GB" sz="2000" spc="-1">
-                <a:solidFill>
-                  <a:srgbClr val="000000"/>
-                </a:solidFill>
-                <a:latin typeface="Calibri"/>
-                <a:cs typeface="Calibri"/>
-              </a:rPr>
-              <a:t>Review done?</a:t>
-            </a:r>
-            <a:endParaRPr lang="en-US" sz="2000" b="0" strike="noStrike" spc="-1" dirty="0">
-              <a:solidFill>
-                <a:srgbClr val="000000"/>
-              </a:solidFill>
-              <a:latin typeface="OpenSymbol"/>
-              <a:ea typeface="OpenSymbol"/>
-            </a:endParaRPr>
+              <a:t>Last Call Review: ready </a:t>
+            </a:r>
+            <a:r>
+              <a:rPr lang="en-US" sz="2000" b="0" strike="noStrike" spc="-1" dirty="0">
+                <a:solidFill>
+                  <a:srgbClr val="000000"/>
+                </a:solidFill>
+                <a:latin typeface="OpenSymbol"/>
+                <a:ea typeface="OpenSymbol"/>
+              </a:rPr>
+              <a:t>✓</a:t>
+            </a:r>
           </a:p>
           <a:p>
             <a:pPr marL="228600" indent="-225360">
@@ -4409,7 +4539,7 @@
                 </a:solidFill>
                 <a:latin typeface="Calibri"/>
               </a:rPr>
-              <a:t>Still open: finalize section on discovery of registrars with BRSKI-AE feature set</a:t>
+              <a:t>TODO: finalize section on discovery of registrars with BRSKI-AE feature set</a:t>
             </a:r>
           </a:p>
           <a:p>
@@ -4436,7 +4566,7 @@
                 </a:solidFill>
                 <a:latin typeface="Calibri"/>
               </a:rPr>
-              <a:t>Thereafter, will be ready for AD review</a:t>
+              <a:t>Soon ready for AD review</a:t>
             </a:r>
           </a:p>
           <a:p>
@@ -9453,6 +9583,15 @@
 </file>
 
 <file path=customXml/item1.xml><?xml version="1.0" encoding="utf-8"?>
+<?mso-contentType ?>
+<FormTemplates xmlns="http://schemas.microsoft.com/sharepoint/v3/contenttype/forms">
+  <Display>DocumentLibraryForm</Display>
+  <Edit>DocumentLibraryForm</Edit>
+  <New>DocumentLibraryForm</New>
+</FormTemplates>
+</file>
+
+<file path=customXml/item2.xml><?xml version="1.0" encoding="utf-8"?>
 <ct:contentTypeSchema xmlns:ct="http://schemas.microsoft.com/office/2006/metadata/contentType" xmlns:ma="http://schemas.microsoft.com/office/2006/metadata/properties/metaAttributes" ct:_="" ma:_="" ma:contentTypeName="Document" ma:contentTypeID="0x01010035CD6C532085F8449DFAA9E5E2A73509" ma:contentTypeVersion="20" ma:contentTypeDescription="Create a new document." ma:contentTypeScope="" ma:versionID="c8bdef1fc4896ae71e847eb90f6c3082">
   <xsd:schema xmlns:xsd="http://www.w3.org/2001/XMLSchema" xmlns:xs="http://www.w3.org/2001/XMLSchema" xmlns:p="http://schemas.microsoft.com/office/2006/metadata/properties" xmlns:ns1="http://schemas.microsoft.com/sharepoint/v3" xmlns:ns2="ce079751-a51b-4a27-9376-edf93eae18d5" xmlns:ns3="a9de424c-86b2-47ed-8d4e-0a9b7010e669" xmlns:ns4="56810815-8df0-4f10-8da7-34164765fbe3" targetNamespace="http://schemas.microsoft.com/office/2006/metadata/properties" ma:root="true" ma:fieldsID="3fdf977c7d89e1bf9cca898b31dbd6fd" ns1:_="" ns2:_="" ns3:_="" ns4:_="">
     <xsd:import namespace="http://schemas.microsoft.com/sharepoint/v3"/>
@@ -9717,15 +9856,6 @@
 </ct:contentTypeSchema>
 </file>
 
-<file path=customXml/item2.xml><?xml version="1.0" encoding="utf-8"?>
-<?mso-contentType ?>
-<FormTemplates xmlns="http://schemas.microsoft.com/sharepoint/v3/contenttype/forms">
-  <Display>DocumentLibraryForm</Display>
-  <Edit>DocumentLibraryForm</Edit>
-  <New>DocumentLibraryForm</New>
-</FormTemplates>
-</file>
-
 <file path=customXml/item3.xml><?xml version="1.0" encoding="utf-8"?>
 <p:properties xmlns:p="http://schemas.microsoft.com/office/2006/metadata/properties" xmlns:xsi="http://www.w3.org/2001/XMLSchema-instance" xmlns:pc="http://schemas.microsoft.com/office/infopath/2007/PartnerControls">
   <documentManagement>
@@ -9740,6 +9870,14 @@
 </file>
 
 <file path=customXml/itemProps1.xml><?xml version="1.0" encoding="utf-8"?>
+<ds:datastoreItem xmlns:ds="http://schemas.openxmlformats.org/officeDocument/2006/customXml" ds:itemID="{5C6BD9E7-C020-4AD1-A7ED-9C09B3AA4FEA}">
+  <ds:schemaRefs>
+    <ds:schemaRef ds:uri="http://schemas.microsoft.com/sharepoint/v3/contenttype/forms"/>
+  </ds:schemaRefs>
+</ds:datastoreItem>
+</file>
+
+<file path=customXml/itemProps2.xml><?xml version="1.0" encoding="utf-8"?>
 <ds:datastoreItem xmlns:ds="http://schemas.openxmlformats.org/officeDocument/2006/customXml" ds:itemID="{E037FCD1-B3DE-4EDE-B6BD-6CF808058DC1}">
   <ds:schemaRefs>
     <ds:schemaRef ds:uri="56810815-8df0-4f10-8da7-34164765fbe3"/>
@@ -9756,14 +9894,6 @@
     <ds:schemaRef ds:uri="http://schemas.microsoft.com/sharepoint/v3"/>
     <ds:schemaRef ds:uri="http://schemas.openxmlformats.org/package/2006/metadata/core-properties"/>
     <ds:schemaRef ds:uri="http://www.w3.org/2001/XMLSchema"/>
-  </ds:schemaRefs>
-</ds:datastoreItem>
-</file>
-
-<file path=customXml/itemProps2.xml><?xml version="1.0" encoding="utf-8"?>
-<ds:datastoreItem xmlns:ds="http://schemas.openxmlformats.org/officeDocument/2006/customXml" ds:itemID="{5C6BD9E7-C020-4AD1-A7ED-9C09B3AA4FEA}">
-  <ds:schemaRefs>
-    <ds:schemaRef ds:uri="http://schemas.microsoft.com/sharepoint/v3/contenttype/forms"/>
   </ds:schemaRefs>
 </ds:datastoreItem>
 </file>

</xml_diff>